<commit_message>
Update Doc(project overview, diagram)
</commit_message>
<xml_diff>
--- a/Study/20170430.pptx
+++ b/Study/20170430.pptx
@@ -250,7 +250,7 @@
           <a:p>
             <a:fld id="{40BEE865-6714-44CF-93DA-61EC65BF40EE}" type="datetimeFigureOut">
               <a:rPr lang="ko-KR" altLang="en-US" smtClean="0"/>
-              <a:t>2017-04-29</a:t>
+              <a:t>2017-04-30</a:t>
             </a:fld>
             <a:endParaRPr lang="ko-KR" altLang="en-US"/>
           </a:p>
@@ -418,7 +418,7 @@
           <a:p>
             <a:fld id="{40BEE865-6714-44CF-93DA-61EC65BF40EE}" type="datetimeFigureOut">
               <a:rPr lang="ko-KR" altLang="en-US" smtClean="0"/>
-              <a:t>2017-04-29</a:t>
+              <a:t>2017-04-30</a:t>
             </a:fld>
             <a:endParaRPr lang="ko-KR" altLang="en-US"/>
           </a:p>
@@ -596,7 +596,7 @@
           <a:p>
             <a:fld id="{40BEE865-6714-44CF-93DA-61EC65BF40EE}" type="datetimeFigureOut">
               <a:rPr lang="ko-KR" altLang="en-US" smtClean="0"/>
-              <a:t>2017-04-29</a:t>
+              <a:t>2017-04-30</a:t>
             </a:fld>
             <a:endParaRPr lang="ko-KR" altLang="en-US"/>
           </a:p>
@@ -764,7 +764,7 @@
           <a:p>
             <a:fld id="{40BEE865-6714-44CF-93DA-61EC65BF40EE}" type="datetimeFigureOut">
               <a:rPr lang="ko-KR" altLang="en-US" smtClean="0"/>
-              <a:t>2017-04-29</a:t>
+              <a:t>2017-04-30</a:t>
             </a:fld>
             <a:endParaRPr lang="ko-KR" altLang="en-US"/>
           </a:p>
@@ -1009,7 +1009,7 @@
           <a:p>
             <a:fld id="{40BEE865-6714-44CF-93DA-61EC65BF40EE}" type="datetimeFigureOut">
               <a:rPr lang="ko-KR" altLang="en-US" smtClean="0"/>
-              <a:t>2017-04-29</a:t>
+              <a:t>2017-04-30</a:t>
             </a:fld>
             <a:endParaRPr lang="ko-KR" altLang="en-US"/>
           </a:p>
@@ -1238,7 +1238,7 @@
           <a:p>
             <a:fld id="{40BEE865-6714-44CF-93DA-61EC65BF40EE}" type="datetimeFigureOut">
               <a:rPr lang="ko-KR" altLang="en-US" smtClean="0"/>
-              <a:t>2017-04-29</a:t>
+              <a:t>2017-04-30</a:t>
             </a:fld>
             <a:endParaRPr lang="ko-KR" altLang="en-US"/>
           </a:p>
@@ -1602,7 +1602,7 @@
           <a:p>
             <a:fld id="{40BEE865-6714-44CF-93DA-61EC65BF40EE}" type="datetimeFigureOut">
               <a:rPr lang="ko-KR" altLang="en-US" smtClean="0"/>
-              <a:t>2017-04-29</a:t>
+              <a:t>2017-04-30</a:t>
             </a:fld>
             <a:endParaRPr lang="ko-KR" altLang="en-US"/>
           </a:p>
@@ -1719,7 +1719,7 @@
           <a:p>
             <a:fld id="{40BEE865-6714-44CF-93DA-61EC65BF40EE}" type="datetimeFigureOut">
               <a:rPr lang="ko-KR" altLang="en-US" smtClean="0"/>
-              <a:t>2017-04-29</a:t>
+              <a:t>2017-04-30</a:t>
             </a:fld>
             <a:endParaRPr lang="ko-KR" altLang="en-US"/>
           </a:p>
@@ -1814,7 +1814,7 @@
           <a:p>
             <a:fld id="{40BEE865-6714-44CF-93DA-61EC65BF40EE}" type="datetimeFigureOut">
               <a:rPr lang="ko-KR" altLang="en-US" smtClean="0"/>
-              <a:t>2017-04-29</a:t>
+              <a:t>2017-04-30</a:t>
             </a:fld>
             <a:endParaRPr lang="ko-KR" altLang="en-US"/>
           </a:p>
@@ -2089,7 +2089,7 @@
           <a:p>
             <a:fld id="{40BEE865-6714-44CF-93DA-61EC65BF40EE}" type="datetimeFigureOut">
               <a:rPr lang="ko-KR" altLang="en-US" smtClean="0"/>
-              <a:t>2017-04-29</a:t>
+              <a:t>2017-04-30</a:t>
             </a:fld>
             <a:endParaRPr lang="ko-KR" altLang="en-US"/>
           </a:p>
@@ -2341,7 +2341,7 @@
           <a:p>
             <a:fld id="{40BEE865-6714-44CF-93DA-61EC65BF40EE}" type="datetimeFigureOut">
               <a:rPr lang="ko-KR" altLang="en-US" smtClean="0"/>
-              <a:t>2017-04-29</a:t>
+              <a:t>2017-04-30</a:t>
             </a:fld>
             <a:endParaRPr lang="ko-KR" altLang="en-US"/>
           </a:p>
@@ -2552,7 +2552,7 @@
           <a:p>
             <a:fld id="{40BEE865-6714-44CF-93DA-61EC65BF40EE}" type="datetimeFigureOut">
               <a:rPr lang="ko-KR" altLang="en-US" smtClean="0"/>
-              <a:t>2017-04-29</a:t>
+              <a:t>2017-04-30</a:t>
             </a:fld>
             <a:endParaRPr lang="ko-KR" altLang="en-US"/>
           </a:p>
@@ -3617,7 +3617,7 @@
           </a:fontRef>
         </p:style>
         <p:txBody>
-          <a:bodyPr rot="0" spcFirstLastPara="0" vertOverflow="overflow" horzOverflow="overflow" vert="horz" wrap="square" lIns="91440" tIns="45720" rIns="91440" bIns="45720" numCol="1" spcCol="0" rtlCol="0" fromWordArt="0" anchor="ctr" anchorCtr="0" forceAA="0" compatLnSpc="1">
+          <a:bodyPr rot="0" spcFirstLastPara="0" vertOverflow="overflow" horzOverflow="overflow" vert="horz" wrap="square" lIns="91440" tIns="45720" rIns="91440" bIns="45720" numCol="1" spcCol="0" rtlCol="0" fromWordArt="0" anchor="t" anchorCtr="0" forceAA="0" compatLnSpc="1">
             <a:prstTxWarp prst="textNoShape">
               <a:avLst/>
             </a:prstTxWarp>
@@ -3626,7 +3626,10 @@
           <a:lstStyle/>
           <a:p>
             <a:pPr algn="ctr"/>
-            <a:endParaRPr lang="ko-KR" altLang="en-US"/>
+            <a:r>
+              <a:rPr lang="ko-KR" altLang="en-US" sz="1600" dirty="0"/>
+              <a:t>안드로이드 어플리케이션</a:t>
+            </a:r>
           </a:p>
         </p:txBody>
       </p:sp>
@@ -4046,894 +4049,909 @@
           <a:chExt cx="0" cy="0"/>
         </a:xfrm>
       </p:grpSpPr>
-      <p:sp>
-        <p:nvSpPr>
-          <p:cNvPr id="4" name="직사각형 3"/>
-          <p:cNvSpPr/>
+      <p:grpSp>
+        <p:nvGrpSpPr>
+          <p:cNvPr id="2" name="그룹 1"/>
+          <p:cNvGrpSpPr/>
           <p:nvPr/>
-        </p:nvSpPr>
-        <p:spPr>
+        </p:nvGrpSpPr>
+        <p:grpSpPr>
           <a:xfrm>
-            <a:off x="2722745" y="2398829"/>
-            <a:ext cx="1097280" cy="1010653"/>
+            <a:off x="2722745" y="1166707"/>
+            <a:ext cx="5909912" cy="4693319"/>
+            <a:chOff x="2722745" y="1166707"/>
+            <a:chExt cx="5909912" cy="4693319"/>
           </a:xfrm>
-          <a:prstGeom prst="rect">
-            <a:avLst/>
-          </a:prstGeom>
-        </p:spPr>
-        <p:style>
-          <a:lnRef idx="2">
-            <a:schemeClr val="accent6"/>
-          </a:lnRef>
-          <a:fillRef idx="1">
-            <a:schemeClr val="lt1"/>
-          </a:fillRef>
-          <a:effectRef idx="0">
-            <a:schemeClr val="accent6"/>
-          </a:effectRef>
-          <a:fontRef idx="minor">
-            <a:schemeClr val="dk1"/>
-          </a:fontRef>
-        </p:style>
-        <p:txBody>
-          <a:bodyPr rtlCol="0" anchor="ctr"/>
-          <a:lstStyle/>
-          <a:p>
-            <a:pPr algn="ctr"/>
-            <a:r>
-              <a:rPr lang="en-US" altLang="ko-KR" sz="1600" dirty="0"/>
-              <a:t>Controller</a:t>
-            </a:r>
-            <a:endParaRPr lang="ko-KR" altLang="en-US" sz="1600" dirty="0"/>
-          </a:p>
-        </p:txBody>
-      </p:sp>
-      <p:sp>
-        <p:nvSpPr>
-          <p:cNvPr id="7" name="직사각형 6"/>
-          <p:cNvSpPr/>
-          <p:nvPr/>
-        </p:nvSpPr>
-        <p:spPr>
-          <a:xfrm>
-            <a:off x="7535377" y="2398829"/>
-            <a:ext cx="1097280" cy="1010653"/>
-          </a:xfrm>
-          <a:prstGeom prst="rect">
-            <a:avLst/>
-          </a:prstGeom>
-        </p:spPr>
-        <p:style>
-          <a:lnRef idx="2">
-            <a:schemeClr val="accent6"/>
-          </a:lnRef>
-          <a:fillRef idx="1">
-            <a:schemeClr val="lt1"/>
-          </a:fillRef>
-          <a:effectRef idx="0">
-            <a:schemeClr val="accent6"/>
-          </a:effectRef>
-          <a:fontRef idx="minor">
-            <a:schemeClr val="dk1"/>
-          </a:fontRef>
-        </p:style>
-        <p:txBody>
-          <a:bodyPr rtlCol="0" anchor="ctr"/>
-          <a:lstStyle/>
-          <a:p>
-            <a:pPr algn="ctr"/>
-            <a:r>
-              <a:rPr lang="en-US" altLang="ko-KR" dirty="0"/>
-              <a:t>Motor</a:t>
-            </a:r>
-            <a:endParaRPr lang="ko-KR" altLang="en-US" dirty="0"/>
-          </a:p>
-        </p:txBody>
-      </p:sp>
-      <p:cxnSp>
-        <p:nvCxnSpPr>
-          <p:cNvPr id="9" name="직선 화살표 연결선 8"/>
-          <p:cNvCxnSpPr>
-            <a:stCxn id="4" idx="3"/>
-            <a:endCxn id="52" idx="1"/>
-          </p:cNvCxnSpPr>
-          <p:nvPr/>
-        </p:nvCxnSpPr>
-        <p:spPr>
-          <a:xfrm flipV="1">
-            <a:off x="3820025" y="1672034"/>
-            <a:ext cx="2120764" cy="1232122"/>
-          </a:xfrm>
-          <a:prstGeom prst="straightConnector1">
-            <a:avLst/>
-          </a:prstGeom>
-          <a:ln>
-            <a:tailEnd type="triangle"/>
-          </a:ln>
-        </p:spPr>
-        <p:style>
-          <a:lnRef idx="1">
-            <a:schemeClr val="accent1"/>
-          </a:lnRef>
-          <a:fillRef idx="0">
-            <a:schemeClr val="accent1"/>
-          </a:fillRef>
-          <a:effectRef idx="0">
-            <a:schemeClr val="accent1"/>
-          </a:effectRef>
-          <a:fontRef idx="minor">
-            <a:schemeClr val="tx1"/>
-          </a:fontRef>
-        </p:style>
-      </p:cxnSp>
-      <p:sp>
-        <p:nvSpPr>
-          <p:cNvPr id="11" name="직사각형 10"/>
-          <p:cNvSpPr/>
-          <p:nvPr/>
-        </p:nvSpPr>
-        <p:spPr>
-          <a:xfrm>
-            <a:off x="3841881" y="4849373"/>
-            <a:ext cx="1097280" cy="1010653"/>
-          </a:xfrm>
-          <a:prstGeom prst="rect">
-            <a:avLst/>
-          </a:prstGeom>
-        </p:spPr>
-        <p:style>
-          <a:lnRef idx="2">
-            <a:schemeClr val="accent6"/>
-          </a:lnRef>
-          <a:fillRef idx="1">
-            <a:schemeClr val="lt1"/>
-          </a:fillRef>
-          <a:effectRef idx="0">
-            <a:schemeClr val="accent6"/>
-          </a:effectRef>
-          <a:fontRef idx="minor">
-            <a:schemeClr val="dk1"/>
-          </a:fontRef>
-        </p:style>
-        <p:txBody>
-          <a:bodyPr rtlCol="0" anchor="ctr"/>
-          <a:lstStyle/>
-          <a:p>
-            <a:pPr algn="ctr"/>
-            <a:r>
-              <a:rPr lang="en-US" altLang="ko-KR" dirty="0"/>
-              <a:t>Battery</a:t>
-            </a:r>
-            <a:endParaRPr lang="ko-KR" altLang="en-US" dirty="0"/>
-          </a:p>
-        </p:txBody>
-      </p:sp>
-      <p:cxnSp>
-        <p:nvCxnSpPr>
-          <p:cNvPr id="12" name="직선 화살표 연결선 11"/>
-          <p:cNvCxnSpPr>
-            <a:stCxn id="11" idx="3"/>
-            <a:endCxn id="52" idx="1"/>
-          </p:cNvCxnSpPr>
-          <p:nvPr/>
-        </p:nvCxnSpPr>
-        <p:spPr>
-          <a:xfrm flipV="1">
-            <a:off x="4939161" y="1672034"/>
-            <a:ext cx="1001628" cy="3682666"/>
-          </a:xfrm>
-          <a:prstGeom prst="straightConnector1">
-            <a:avLst/>
-          </a:prstGeom>
-          <a:ln>
-            <a:tailEnd type="triangle"/>
-          </a:ln>
-        </p:spPr>
-        <p:style>
-          <a:lnRef idx="1">
-            <a:schemeClr val="accent2"/>
-          </a:lnRef>
-          <a:fillRef idx="0">
-            <a:schemeClr val="accent2"/>
-          </a:fillRef>
-          <a:effectRef idx="0">
-            <a:schemeClr val="accent2"/>
-          </a:effectRef>
-          <a:fontRef idx="minor">
-            <a:schemeClr val="tx1"/>
-          </a:fontRef>
-        </p:style>
-      </p:cxnSp>
-      <p:sp>
-        <p:nvSpPr>
-          <p:cNvPr id="42" name="직사각형 41"/>
-          <p:cNvSpPr/>
-          <p:nvPr/>
-        </p:nvSpPr>
-        <p:spPr>
-          <a:xfrm>
-            <a:off x="7535377" y="1166707"/>
-            <a:ext cx="1097280" cy="1010653"/>
-          </a:xfrm>
-          <a:prstGeom prst="rect">
-            <a:avLst/>
-          </a:prstGeom>
-        </p:spPr>
-        <p:style>
-          <a:lnRef idx="2">
-            <a:schemeClr val="accent6"/>
-          </a:lnRef>
-          <a:fillRef idx="1">
-            <a:schemeClr val="lt1"/>
-          </a:fillRef>
-          <a:effectRef idx="0">
-            <a:schemeClr val="accent6"/>
-          </a:effectRef>
-          <a:fontRef idx="minor">
-            <a:schemeClr val="dk1"/>
-          </a:fontRef>
-        </p:style>
-        <p:txBody>
-          <a:bodyPr rtlCol="0" anchor="ctr"/>
-          <a:lstStyle/>
-          <a:p>
-            <a:pPr algn="ctr"/>
-            <a:r>
-              <a:rPr lang="en-US" altLang="ko-KR" dirty="0"/>
-              <a:t>Motor</a:t>
-            </a:r>
-            <a:endParaRPr lang="ko-KR" altLang="en-US" dirty="0"/>
-          </a:p>
-        </p:txBody>
-      </p:sp>
-      <p:sp>
-        <p:nvSpPr>
-          <p:cNvPr id="45" name="직사각형 44"/>
-          <p:cNvSpPr/>
-          <p:nvPr/>
-        </p:nvSpPr>
-        <p:spPr>
-          <a:xfrm>
-            <a:off x="7535377" y="4849373"/>
-            <a:ext cx="1097280" cy="1010653"/>
-          </a:xfrm>
-          <a:prstGeom prst="rect">
-            <a:avLst/>
-          </a:prstGeom>
-        </p:spPr>
-        <p:style>
-          <a:lnRef idx="2">
-            <a:schemeClr val="accent6"/>
-          </a:lnRef>
-          <a:fillRef idx="1">
-            <a:schemeClr val="lt1"/>
-          </a:fillRef>
-          <a:effectRef idx="0">
-            <a:schemeClr val="accent6"/>
-          </a:effectRef>
-          <a:fontRef idx="minor">
-            <a:schemeClr val="dk1"/>
-          </a:fontRef>
-        </p:style>
-        <p:txBody>
-          <a:bodyPr rtlCol="0" anchor="ctr"/>
-          <a:lstStyle/>
-          <a:p>
-            <a:pPr algn="ctr"/>
-            <a:r>
-              <a:rPr lang="en-US" altLang="ko-KR" dirty="0"/>
-              <a:t>Motor</a:t>
-            </a:r>
-            <a:endParaRPr lang="ko-KR" altLang="en-US" dirty="0"/>
-          </a:p>
-        </p:txBody>
-      </p:sp>
-      <p:sp>
-        <p:nvSpPr>
-          <p:cNvPr id="46" name="직사각형 45"/>
-          <p:cNvSpPr/>
-          <p:nvPr/>
-        </p:nvSpPr>
-        <p:spPr>
-          <a:xfrm>
-            <a:off x="7535377" y="3626385"/>
-            <a:ext cx="1097280" cy="1010653"/>
-          </a:xfrm>
-          <a:prstGeom prst="rect">
-            <a:avLst/>
-          </a:prstGeom>
-        </p:spPr>
-        <p:style>
-          <a:lnRef idx="2">
-            <a:schemeClr val="accent6"/>
-          </a:lnRef>
-          <a:fillRef idx="1">
-            <a:schemeClr val="lt1"/>
-          </a:fillRef>
-          <a:effectRef idx="0">
-            <a:schemeClr val="accent6"/>
-          </a:effectRef>
-          <a:fontRef idx="minor">
-            <a:schemeClr val="dk1"/>
-          </a:fontRef>
-        </p:style>
-        <p:txBody>
-          <a:bodyPr rtlCol="0" anchor="ctr"/>
-          <a:lstStyle/>
-          <a:p>
-            <a:pPr algn="ctr"/>
-            <a:r>
-              <a:rPr lang="en-US" altLang="ko-KR" dirty="0"/>
-              <a:t>Motor</a:t>
-            </a:r>
-            <a:endParaRPr lang="ko-KR" altLang="en-US" dirty="0"/>
-          </a:p>
-        </p:txBody>
-      </p:sp>
-      <p:sp>
-        <p:nvSpPr>
-          <p:cNvPr id="51" name="직사각형 50"/>
-          <p:cNvSpPr/>
-          <p:nvPr/>
-        </p:nvSpPr>
-        <p:spPr>
-          <a:xfrm>
-            <a:off x="5940789" y="2398829"/>
-            <a:ext cx="1097280" cy="1010653"/>
-          </a:xfrm>
-          <a:prstGeom prst="rect">
-            <a:avLst/>
-          </a:prstGeom>
-        </p:spPr>
-        <p:style>
-          <a:lnRef idx="2">
-            <a:schemeClr val="accent6"/>
-          </a:lnRef>
-          <a:fillRef idx="1">
-            <a:schemeClr val="lt1"/>
-          </a:fillRef>
-          <a:effectRef idx="0">
-            <a:schemeClr val="accent6"/>
-          </a:effectRef>
-          <a:fontRef idx="minor">
-            <a:schemeClr val="dk1"/>
-          </a:fontRef>
-        </p:style>
-        <p:txBody>
-          <a:bodyPr rtlCol="0" anchor="ctr"/>
-          <a:lstStyle/>
-          <a:p>
-            <a:pPr algn="ctr"/>
-            <a:r>
-              <a:rPr lang="en-US" altLang="ko-KR" dirty="0"/>
-              <a:t>ESC</a:t>
-            </a:r>
-            <a:endParaRPr lang="ko-KR" altLang="en-US" dirty="0"/>
-          </a:p>
-        </p:txBody>
-      </p:sp>
-      <p:sp>
-        <p:nvSpPr>
-          <p:cNvPr id="52" name="직사각형 51"/>
-          <p:cNvSpPr/>
-          <p:nvPr/>
-        </p:nvSpPr>
-        <p:spPr>
-          <a:xfrm>
-            <a:off x="5940789" y="1166707"/>
-            <a:ext cx="1097280" cy="1010653"/>
-          </a:xfrm>
-          <a:prstGeom prst="rect">
-            <a:avLst/>
-          </a:prstGeom>
-        </p:spPr>
-        <p:style>
-          <a:lnRef idx="2">
-            <a:schemeClr val="accent6"/>
-          </a:lnRef>
-          <a:fillRef idx="1">
-            <a:schemeClr val="lt1"/>
-          </a:fillRef>
-          <a:effectRef idx="0">
-            <a:schemeClr val="accent6"/>
-          </a:effectRef>
-          <a:fontRef idx="minor">
-            <a:schemeClr val="dk1"/>
-          </a:fontRef>
-        </p:style>
-        <p:txBody>
-          <a:bodyPr rtlCol="0" anchor="ctr"/>
-          <a:lstStyle/>
-          <a:p>
-            <a:pPr algn="ctr"/>
-            <a:r>
-              <a:rPr lang="en-US" altLang="ko-KR" dirty="0"/>
-              <a:t>ESC</a:t>
-            </a:r>
-            <a:endParaRPr lang="ko-KR" altLang="en-US" dirty="0"/>
-          </a:p>
-        </p:txBody>
-      </p:sp>
-      <p:sp>
-        <p:nvSpPr>
-          <p:cNvPr id="53" name="직사각형 52"/>
-          <p:cNvSpPr/>
-          <p:nvPr/>
-        </p:nvSpPr>
-        <p:spPr>
-          <a:xfrm>
-            <a:off x="5940789" y="4849373"/>
-            <a:ext cx="1097280" cy="1010653"/>
-          </a:xfrm>
-          <a:prstGeom prst="rect">
-            <a:avLst/>
-          </a:prstGeom>
-        </p:spPr>
-        <p:style>
-          <a:lnRef idx="2">
-            <a:schemeClr val="accent6"/>
-          </a:lnRef>
-          <a:fillRef idx="1">
-            <a:schemeClr val="lt1"/>
-          </a:fillRef>
-          <a:effectRef idx="0">
-            <a:schemeClr val="accent6"/>
-          </a:effectRef>
-          <a:fontRef idx="minor">
-            <a:schemeClr val="dk1"/>
-          </a:fontRef>
-        </p:style>
-        <p:txBody>
-          <a:bodyPr rtlCol="0" anchor="ctr"/>
-          <a:lstStyle/>
-          <a:p>
-            <a:pPr algn="ctr"/>
-            <a:r>
-              <a:rPr lang="en-US" altLang="ko-KR" dirty="0"/>
-              <a:t>ESC</a:t>
-            </a:r>
-            <a:endParaRPr lang="ko-KR" altLang="en-US" dirty="0"/>
-          </a:p>
-        </p:txBody>
-      </p:sp>
-      <p:sp>
-        <p:nvSpPr>
-          <p:cNvPr id="54" name="직사각형 53"/>
-          <p:cNvSpPr/>
-          <p:nvPr/>
-        </p:nvSpPr>
-        <p:spPr>
-          <a:xfrm>
-            <a:off x="5940789" y="3626385"/>
-            <a:ext cx="1097280" cy="1010653"/>
-          </a:xfrm>
-          <a:prstGeom prst="rect">
-            <a:avLst/>
-          </a:prstGeom>
-        </p:spPr>
-        <p:style>
-          <a:lnRef idx="2">
-            <a:schemeClr val="accent6"/>
-          </a:lnRef>
-          <a:fillRef idx="1">
-            <a:schemeClr val="lt1"/>
-          </a:fillRef>
-          <a:effectRef idx="0">
-            <a:schemeClr val="accent6"/>
-          </a:effectRef>
-          <a:fontRef idx="minor">
-            <a:schemeClr val="dk1"/>
-          </a:fontRef>
-        </p:style>
-        <p:txBody>
-          <a:bodyPr rtlCol="0" anchor="ctr"/>
-          <a:lstStyle/>
-          <a:p>
-            <a:pPr algn="ctr"/>
-            <a:r>
-              <a:rPr lang="en-US" altLang="ko-KR" dirty="0"/>
-              <a:t>ESC</a:t>
-            </a:r>
-            <a:endParaRPr lang="ko-KR" altLang="en-US" dirty="0"/>
-          </a:p>
-        </p:txBody>
-      </p:sp>
-      <p:cxnSp>
-        <p:nvCxnSpPr>
-          <p:cNvPr id="60" name="직선 화살표 연결선 59"/>
-          <p:cNvCxnSpPr>
-            <a:stCxn id="4" idx="3"/>
-            <a:endCxn id="51" idx="1"/>
-          </p:cNvCxnSpPr>
-          <p:nvPr/>
-        </p:nvCxnSpPr>
-        <p:spPr>
-          <a:xfrm>
-            <a:off x="3820025" y="2904156"/>
-            <a:ext cx="2120764" cy="0"/>
-          </a:xfrm>
-          <a:prstGeom prst="straightConnector1">
-            <a:avLst/>
-          </a:prstGeom>
-          <a:ln>
-            <a:tailEnd type="triangle"/>
-          </a:ln>
-        </p:spPr>
-        <p:style>
-          <a:lnRef idx="1">
-            <a:schemeClr val="accent1"/>
-          </a:lnRef>
-          <a:fillRef idx="0">
-            <a:schemeClr val="accent1"/>
-          </a:fillRef>
-          <a:effectRef idx="0">
-            <a:schemeClr val="accent1"/>
-          </a:effectRef>
-          <a:fontRef idx="minor">
-            <a:schemeClr val="tx1"/>
-          </a:fontRef>
-        </p:style>
-      </p:cxnSp>
-      <p:cxnSp>
-        <p:nvCxnSpPr>
-          <p:cNvPr id="63" name="직선 화살표 연결선 62"/>
-          <p:cNvCxnSpPr>
-            <a:stCxn id="4" idx="3"/>
-            <a:endCxn id="54" idx="1"/>
-          </p:cNvCxnSpPr>
-          <p:nvPr/>
-        </p:nvCxnSpPr>
-        <p:spPr>
-          <a:xfrm>
-            <a:off x="3820025" y="2904156"/>
-            <a:ext cx="2120764" cy="1227556"/>
-          </a:xfrm>
-          <a:prstGeom prst="straightConnector1">
-            <a:avLst/>
-          </a:prstGeom>
-          <a:ln>
-            <a:tailEnd type="triangle"/>
-          </a:ln>
-        </p:spPr>
-        <p:style>
-          <a:lnRef idx="1">
-            <a:schemeClr val="accent1"/>
-          </a:lnRef>
-          <a:fillRef idx="0">
-            <a:schemeClr val="accent1"/>
-          </a:fillRef>
-          <a:effectRef idx="0">
-            <a:schemeClr val="accent1"/>
-          </a:effectRef>
-          <a:fontRef idx="minor">
-            <a:schemeClr val="tx1"/>
-          </a:fontRef>
-        </p:style>
-      </p:cxnSp>
-      <p:cxnSp>
-        <p:nvCxnSpPr>
-          <p:cNvPr id="66" name="직선 화살표 연결선 65"/>
-          <p:cNvCxnSpPr>
-            <a:stCxn id="4" idx="3"/>
-            <a:endCxn id="53" idx="1"/>
-          </p:cNvCxnSpPr>
-          <p:nvPr/>
-        </p:nvCxnSpPr>
-        <p:spPr>
-          <a:xfrm>
-            <a:off x="3820025" y="2904156"/>
-            <a:ext cx="2120764" cy="2450544"/>
-          </a:xfrm>
-          <a:prstGeom prst="straightConnector1">
-            <a:avLst/>
-          </a:prstGeom>
-          <a:ln>
-            <a:tailEnd type="triangle"/>
-          </a:ln>
-        </p:spPr>
-        <p:style>
-          <a:lnRef idx="1">
-            <a:schemeClr val="accent1"/>
-          </a:lnRef>
-          <a:fillRef idx="0">
-            <a:schemeClr val="accent1"/>
-          </a:fillRef>
-          <a:effectRef idx="0">
-            <a:schemeClr val="accent1"/>
-          </a:effectRef>
-          <a:fontRef idx="minor">
-            <a:schemeClr val="tx1"/>
-          </a:fontRef>
-        </p:style>
-      </p:cxnSp>
-      <p:cxnSp>
-        <p:nvCxnSpPr>
-          <p:cNvPr id="71" name="직선 화살표 연결선 70"/>
-          <p:cNvCxnSpPr>
-            <a:stCxn id="11" idx="3"/>
-            <a:endCxn id="51" idx="1"/>
-          </p:cNvCxnSpPr>
-          <p:nvPr/>
-        </p:nvCxnSpPr>
-        <p:spPr>
-          <a:xfrm flipV="1">
-            <a:off x="4939161" y="2904156"/>
-            <a:ext cx="1001628" cy="2450544"/>
-          </a:xfrm>
-          <a:prstGeom prst="straightConnector1">
-            <a:avLst/>
-          </a:prstGeom>
-          <a:ln>
-            <a:tailEnd type="triangle"/>
-          </a:ln>
-        </p:spPr>
-        <p:style>
-          <a:lnRef idx="1">
-            <a:schemeClr val="accent2"/>
-          </a:lnRef>
-          <a:fillRef idx="0">
-            <a:schemeClr val="accent2"/>
-          </a:fillRef>
-          <a:effectRef idx="0">
-            <a:schemeClr val="accent2"/>
-          </a:effectRef>
-          <a:fontRef idx="minor">
-            <a:schemeClr val="tx1"/>
-          </a:fontRef>
-        </p:style>
-      </p:cxnSp>
-      <p:cxnSp>
-        <p:nvCxnSpPr>
-          <p:cNvPr id="74" name="직선 화살표 연결선 73"/>
-          <p:cNvCxnSpPr>
-            <a:stCxn id="11" idx="3"/>
-            <a:endCxn id="54" idx="1"/>
-          </p:cNvCxnSpPr>
-          <p:nvPr/>
-        </p:nvCxnSpPr>
-        <p:spPr>
-          <a:xfrm flipV="1">
-            <a:off x="4939161" y="4131712"/>
-            <a:ext cx="1001628" cy="1222988"/>
-          </a:xfrm>
-          <a:prstGeom prst="straightConnector1">
-            <a:avLst/>
-          </a:prstGeom>
-          <a:ln>
-            <a:tailEnd type="triangle"/>
-          </a:ln>
-        </p:spPr>
-        <p:style>
-          <a:lnRef idx="1">
-            <a:schemeClr val="accent2"/>
-          </a:lnRef>
-          <a:fillRef idx="0">
-            <a:schemeClr val="accent2"/>
-          </a:fillRef>
-          <a:effectRef idx="0">
-            <a:schemeClr val="accent2"/>
-          </a:effectRef>
-          <a:fontRef idx="minor">
-            <a:schemeClr val="tx1"/>
-          </a:fontRef>
-        </p:style>
-      </p:cxnSp>
-      <p:cxnSp>
-        <p:nvCxnSpPr>
-          <p:cNvPr id="77" name="직선 화살표 연결선 76"/>
-          <p:cNvCxnSpPr>
-            <a:stCxn id="11" idx="3"/>
-            <a:endCxn id="53" idx="1"/>
-          </p:cNvCxnSpPr>
-          <p:nvPr/>
-        </p:nvCxnSpPr>
-        <p:spPr>
-          <a:xfrm>
-            <a:off x="4939161" y="5354700"/>
-            <a:ext cx="1001628" cy="0"/>
-          </a:xfrm>
-          <a:prstGeom prst="straightConnector1">
-            <a:avLst/>
-          </a:prstGeom>
-          <a:ln>
-            <a:tailEnd type="triangle"/>
-          </a:ln>
-        </p:spPr>
-        <p:style>
-          <a:lnRef idx="1">
-            <a:schemeClr val="accent2"/>
-          </a:lnRef>
-          <a:fillRef idx="0">
-            <a:schemeClr val="accent2"/>
-          </a:fillRef>
-          <a:effectRef idx="0">
-            <a:schemeClr val="accent2"/>
-          </a:effectRef>
-          <a:fontRef idx="minor">
-            <a:schemeClr val="tx1"/>
-          </a:fontRef>
-        </p:style>
-      </p:cxnSp>
-      <p:cxnSp>
-        <p:nvCxnSpPr>
-          <p:cNvPr id="89" name="직선 화살표 연결선 88"/>
-          <p:cNvCxnSpPr>
-            <a:stCxn id="11" idx="0"/>
-            <a:endCxn id="4" idx="2"/>
-          </p:cNvCxnSpPr>
-          <p:nvPr/>
-        </p:nvCxnSpPr>
-        <p:spPr>
-          <a:xfrm flipH="1" flipV="1">
-            <a:off x="3271385" y="3409482"/>
-            <a:ext cx="1119136" cy="1439891"/>
-          </a:xfrm>
-          <a:prstGeom prst="straightConnector1">
-            <a:avLst/>
-          </a:prstGeom>
-          <a:ln>
-            <a:tailEnd type="triangle"/>
-          </a:ln>
-        </p:spPr>
-        <p:style>
-          <a:lnRef idx="1">
-            <a:schemeClr val="accent2"/>
-          </a:lnRef>
-          <a:fillRef idx="0">
-            <a:schemeClr val="accent2"/>
-          </a:fillRef>
-          <a:effectRef idx="0">
-            <a:schemeClr val="accent2"/>
-          </a:effectRef>
-          <a:fontRef idx="minor">
-            <a:schemeClr val="tx1"/>
-          </a:fontRef>
-        </p:style>
-      </p:cxnSp>
-      <p:cxnSp>
-        <p:nvCxnSpPr>
-          <p:cNvPr id="91" name="직선 화살표 연결선 90"/>
-          <p:cNvCxnSpPr>
-            <a:stCxn id="52" idx="3"/>
-            <a:endCxn id="42" idx="1"/>
-          </p:cNvCxnSpPr>
-          <p:nvPr/>
-        </p:nvCxnSpPr>
-        <p:spPr>
-          <a:xfrm>
-            <a:off x="7038069" y="1672034"/>
-            <a:ext cx="497308" cy="0"/>
-          </a:xfrm>
-          <a:prstGeom prst="straightConnector1">
-            <a:avLst/>
-          </a:prstGeom>
-          <a:ln>
-            <a:tailEnd type="triangle"/>
-          </a:ln>
-        </p:spPr>
-        <p:style>
-          <a:lnRef idx="1">
-            <a:schemeClr val="accent2"/>
-          </a:lnRef>
-          <a:fillRef idx="0">
-            <a:schemeClr val="accent2"/>
-          </a:fillRef>
-          <a:effectRef idx="0">
-            <a:schemeClr val="accent2"/>
-          </a:effectRef>
-          <a:fontRef idx="minor">
-            <a:schemeClr val="tx1"/>
-          </a:fontRef>
-        </p:style>
-      </p:cxnSp>
-      <p:cxnSp>
-        <p:nvCxnSpPr>
-          <p:cNvPr id="93" name="직선 화살표 연결선 92"/>
-          <p:cNvCxnSpPr>
-            <a:stCxn id="51" idx="3"/>
-            <a:endCxn id="7" idx="1"/>
-          </p:cNvCxnSpPr>
-          <p:nvPr/>
-        </p:nvCxnSpPr>
-        <p:spPr>
-          <a:xfrm>
-            <a:off x="7038069" y="2904156"/>
-            <a:ext cx="497308" cy="0"/>
-          </a:xfrm>
-          <a:prstGeom prst="straightConnector1">
-            <a:avLst/>
-          </a:prstGeom>
-          <a:ln>
-            <a:tailEnd type="triangle"/>
-          </a:ln>
-        </p:spPr>
-        <p:style>
-          <a:lnRef idx="1">
-            <a:schemeClr val="accent2"/>
-          </a:lnRef>
-          <a:fillRef idx="0">
-            <a:schemeClr val="accent2"/>
-          </a:fillRef>
-          <a:effectRef idx="0">
-            <a:schemeClr val="accent2"/>
-          </a:effectRef>
-          <a:fontRef idx="minor">
-            <a:schemeClr val="tx1"/>
-          </a:fontRef>
-        </p:style>
-      </p:cxnSp>
-      <p:cxnSp>
-        <p:nvCxnSpPr>
-          <p:cNvPr id="95" name="직선 화살표 연결선 94"/>
-          <p:cNvCxnSpPr>
-            <a:stCxn id="54" idx="3"/>
-            <a:endCxn id="46" idx="1"/>
-          </p:cNvCxnSpPr>
-          <p:nvPr/>
-        </p:nvCxnSpPr>
-        <p:spPr>
-          <a:xfrm>
-            <a:off x="7038069" y="4131712"/>
-            <a:ext cx="497308" cy="0"/>
-          </a:xfrm>
-          <a:prstGeom prst="straightConnector1">
-            <a:avLst/>
-          </a:prstGeom>
-          <a:ln>
-            <a:tailEnd type="triangle"/>
-          </a:ln>
-        </p:spPr>
-        <p:style>
-          <a:lnRef idx="1">
-            <a:schemeClr val="accent2"/>
-          </a:lnRef>
-          <a:fillRef idx="0">
-            <a:schemeClr val="accent2"/>
-          </a:fillRef>
-          <a:effectRef idx="0">
-            <a:schemeClr val="accent2"/>
-          </a:effectRef>
-          <a:fontRef idx="minor">
-            <a:schemeClr val="tx1"/>
-          </a:fontRef>
-        </p:style>
-      </p:cxnSp>
-      <p:cxnSp>
-        <p:nvCxnSpPr>
-          <p:cNvPr id="97" name="직선 화살표 연결선 96"/>
-          <p:cNvCxnSpPr>
-            <a:stCxn id="53" idx="3"/>
-            <a:endCxn id="45" idx="1"/>
-          </p:cNvCxnSpPr>
-          <p:nvPr/>
-        </p:nvCxnSpPr>
-        <p:spPr>
-          <a:xfrm>
-            <a:off x="7038069" y="5354700"/>
-            <a:ext cx="497308" cy="0"/>
-          </a:xfrm>
-          <a:prstGeom prst="straightConnector1">
-            <a:avLst/>
-          </a:prstGeom>
-          <a:ln>
-            <a:tailEnd type="triangle"/>
-          </a:ln>
-        </p:spPr>
-        <p:style>
-          <a:lnRef idx="1">
-            <a:schemeClr val="accent2"/>
-          </a:lnRef>
-          <a:fillRef idx="0">
-            <a:schemeClr val="accent2"/>
-          </a:fillRef>
-          <a:effectRef idx="0">
-            <a:schemeClr val="accent2"/>
-          </a:effectRef>
-          <a:fontRef idx="minor">
-            <a:schemeClr val="tx1"/>
-          </a:fontRef>
-        </p:style>
-      </p:cxnSp>
+        </p:grpSpPr>
+        <p:sp>
+          <p:nvSpPr>
+            <p:cNvPr id="4" name="직사각형 3"/>
+            <p:cNvSpPr/>
+            <p:nvPr/>
+          </p:nvSpPr>
+          <p:spPr>
+            <a:xfrm>
+              <a:off x="2722745" y="2398829"/>
+              <a:ext cx="1097280" cy="1010653"/>
+            </a:xfrm>
+            <a:prstGeom prst="rect">
+              <a:avLst/>
+            </a:prstGeom>
+          </p:spPr>
+          <p:style>
+            <a:lnRef idx="2">
+              <a:schemeClr val="accent6"/>
+            </a:lnRef>
+            <a:fillRef idx="1">
+              <a:schemeClr val="lt1"/>
+            </a:fillRef>
+            <a:effectRef idx="0">
+              <a:schemeClr val="accent6"/>
+            </a:effectRef>
+            <a:fontRef idx="minor">
+              <a:schemeClr val="dk1"/>
+            </a:fontRef>
+          </p:style>
+          <p:txBody>
+            <a:bodyPr rtlCol="0" anchor="ctr"/>
+            <a:lstStyle/>
+            <a:p>
+              <a:pPr algn="ctr"/>
+              <a:r>
+                <a:rPr lang="en-US" altLang="ko-KR" sz="1600" dirty="0"/>
+                <a:t>Controller</a:t>
+              </a:r>
+              <a:endParaRPr lang="ko-KR" altLang="en-US" sz="1600" dirty="0"/>
+            </a:p>
+          </p:txBody>
+        </p:sp>
+        <p:sp>
+          <p:nvSpPr>
+            <p:cNvPr id="7" name="직사각형 6"/>
+            <p:cNvSpPr/>
+            <p:nvPr/>
+          </p:nvSpPr>
+          <p:spPr>
+            <a:xfrm>
+              <a:off x="7535377" y="2398829"/>
+              <a:ext cx="1097280" cy="1010653"/>
+            </a:xfrm>
+            <a:prstGeom prst="rect">
+              <a:avLst/>
+            </a:prstGeom>
+          </p:spPr>
+          <p:style>
+            <a:lnRef idx="2">
+              <a:schemeClr val="accent6"/>
+            </a:lnRef>
+            <a:fillRef idx="1">
+              <a:schemeClr val="lt1"/>
+            </a:fillRef>
+            <a:effectRef idx="0">
+              <a:schemeClr val="accent6"/>
+            </a:effectRef>
+            <a:fontRef idx="minor">
+              <a:schemeClr val="dk1"/>
+            </a:fontRef>
+          </p:style>
+          <p:txBody>
+            <a:bodyPr rtlCol="0" anchor="ctr"/>
+            <a:lstStyle/>
+            <a:p>
+              <a:pPr algn="ctr"/>
+              <a:r>
+                <a:rPr lang="en-US" altLang="ko-KR" dirty="0"/>
+                <a:t>Motor</a:t>
+              </a:r>
+              <a:endParaRPr lang="ko-KR" altLang="en-US" dirty="0"/>
+            </a:p>
+          </p:txBody>
+        </p:sp>
+        <p:cxnSp>
+          <p:nvCxnSpPr>
+            <p:cNvPr id="9" name="직선 화살표 연결선 8"/>
+            <p:cNvCxnSpPr>
+              <a:stCxn id="4" idx="3"/>
+              <a:endCxn id="52" idx="1"/>
+            </p:cNvCxnSpPr>
+            <p:nvPr/>
+          </p:nvCxnSpPr>
+          <p:spPr>
+            <a:xfrm flipV="1">
+              <a:off x="3820025" y="1672034"/>
+              <a:ext cx="2120764" cy="1232122"/>
+            </a:xfrm>
+            <a:prstGeom prst="straightConnector1">
+              <a:avLst/>
+            </a:prstGeom>
+            <a:ln>
+              <a:tailEnd type="triangle"/>
+            </a:ln>
+          </p:spPr>
+          <p:style>
+            <a:lnRef idx="1">
+              <a:schemeClr val="accent1"/>
+            </a:lnRef>
+            <a:fillRef idx="0">
+              <a:schemeClr val="accent1"/>
+            </a:fillRef>
+            <a:effectRef idx="0">
+              <a:schemeClr val="accent1"/>
+            </a:effectRef>
+            <a:fontRef idx="minor">
+              <a:schemeClr val="tx1"/>
+            </a:fontRef>
+          </p:style>
+        </p:cxnSp>
+        <p:sp>
+          <p:nvSpPr>
+            <p:cNvPr id="11" name="직사각형 10"/>
+            <p:cNvSpPr/>
+            <p:nvPr/>
+          </p:nvSpPr>
+          <p:spPr>
+            <a:xfrm>
+              <a:off x="3841881" y="4849373"/>
+              <a:ext cx="1097280" cy="1010653"/>
+            </a:xfrm>
+            <a:prstGeom prst="rect">
+              <a:avLst/>
+            </a:prstGeom>
+          </p:spPr>
+          <p:style>
+            <a:lnRef idx="2">
+              <a:schemeClr val="accent6"/>
+            </a:lnRef>
+            <a:fillRef idx="1">
+              <a:schemeClr val="lt1"/>
+            </a:fillRef>
+            <a:effectRef idx="0">
+              <a:schemeClr val="accent6"/>
+            </a:effectRef>
+            <a:fontRef idx="minor">
+              <a:schemeClr val="dk1"/>
+            </a:fontRef>
+          </p:style>
+          <p:txBody>
+            <a:bodyPr rtlCol="0" anchor="ctr"/>
+            <a:lstStyle/>
+            <a:p>
+              <a:pPr algn="ctr"/>
+              <a:r>
+                <a:rPr lang="en-US" altLang="ko-KR" dirty="0"/>
+                <a:t>Battery</a:t>
+              </a:r>
+              <a:endParaRPr lang="ko-KR" altLang="en-US" dirty="0"/>
+            </a:p>
+          </p:txBody>
+        </p:sp>
+        <p:cxnSp>
+          <p:nvCxnSpPr>
+            <p:cNvPr id="12" name="직선 화살표 연결선 11"/>
+            <p:cNvCxnSpPr>
+              <a:stCxn id="11" idx="3"/>
+              <a:endCxn id="52" idx="1"/>
+            </p:cNvCxnSpPr>
+            <p:nvPr/>
+          </p:nvCxnSpPr>
+          <p:spPr>
+            <a:xfrm flipV="1">
+              <a:off x="4939161" y="1672034"/>
+              <a:ext cx="1001628" cy="3682666"/>
+            </a:xfrm>
+            <a:prstGeom prst="straightConnector1">
+              <a:avLst/>
+            </a:prstGeom>
+            <a:ln>
+              <a:tailEnd type="triangle"/>
+            </a:ln>
+          </p:spPr>
+          <p:style>
+            <a:lnRef idx="1">
+              <a:schemeClr val="accent2"/>
+            </a:lnRef>
+            <a:fillRef idx="0">
+              <a:schemeClr val="accent2"/>
+            </a:fillRef>
+            <a:effectRef idx="0">
+              <a:schemeClr val="accent2"/>
+            </a:effectRef>
+            <a:fontRef idx="minor">
+              <a:schemeClr val="tx1"/>
+            </a:fontRef>
+          </p:style>
+        </p:cxnSp>
+        <p:sp>
+          <p:nvSpPr>
+            <p:cNvPr id="42" name="직사각형 41"/>
+            <p:cNvSpPr/>
+            <p:nvPr/>
+          </p:nvSpPr>
+          <p:spPr>
+            <a:xfrm>
+              <a:off x="7535377" y="1166707"/>
+              <a:ext cx="1097280" cy="1010653"/>
+            </a:xfrm>
+            <a:prstGeom prst="rect">
+              <a:avLst/>
+            </a:prstGeom>
+          </p:spPr>
+          <p:style>
+            <a:lnRef idx="2">
+              <a:schemeClr val="accent6"/>
+            </a:lnRef>
+            <a:fillRef idx="1">
+              <a:schemeClr val="lt1"/>
+            </a:fillRef>
+            <a:effectRef idx="0">
+              <a:schemeClr val="accent6"/>
+            </a:effectRef>
+            <a:fontRef idx="minor">
+              <a:schemeClr val="dk1"/>
+            </a:fontRef>
+          </p:style>
+          <p:txBody>
+            <a:bodyPr rtlCol="0" anchor="ctr"/>
+            <a:lstStyle/>
+            <a:p>
+              <a:pPr algn="ctr"/>
+              <a:r>
+                <a:rPr lang="en-US" altLang="ko-KR" dirty="0"/>
+                <a:t>Motor</a:t>
+              </a:r>
+              <a:endParaRPr lang="ko-KR" altLang="en-US" dirty="0"/>
+            </a:p>
+          </p:txBody>
+        </p:sp>
+        <p:sp>
+          <p:nvSpPr>
+            <p:cNvPr id="45" name="직사각형 44"/>
+            <p:cNvSpPr/>
+            <p:nvPr/>
+          </p:nvSpPr>
+          <p:spPr>
+            <a:xfrm>
+              <a:off x="7535377" y="4849373"/>
+              <a:ext cx="1097280" cy="1010653"/>
+            </a:xfrm>
+            <a:prstGeom prst="rect">
+              <a:avLst/>
+            </a:prstGeom>
+          </p:spPr>
+          <p:style>
+            <a:lnRef idx="2">
+              <a:schemeClr val="accent6"/>
+            </a:lnRef>
+            <a:fillRef idx="1">
+              <a:schemeClr val="lt1"/>
+            </a:fillRef>
+            <a:effectRef idx="0">
+              <a:schemeClr val="accent6"/>
+            </a:effectRef>
+            <a:fontRef idx="minor">
+              <a:schemeClr val="dk1"/>
+            </a:fontRef>
+          </p:style>
+          <p:txBody>
+            <a:bodyPr rtlCol="0" anchor="ctr"/>
+            <a:lstStyle/>
+            <a:p>
+              <a:pPr algn="ctr"/>
+              <a:r>
+                <a:rPr lang="en-US" altLang="ko-KR" dirty="0"/>
+                <a:t>Motor</a:t>
+              </a:r>
+              <a:endParaRPr lang="ko-KR" altLang="en-US" dirty="0"/>
+            </a:p>
+          </p:txBody>
+        </p:sp>
+        <p:sp>
+          <p:nvSpPr>
+            <p:cNvPr id="46" name="직사각형 45"/>
+            <p:cNvSpPr/>
+            <p:nvPr/>
+          </p:nvSpPr>
+          <p:spPr>
+            <a:xfrm>
+              <a:off x="7535377" y="3626385"/>
+              <a:ext cx="1097280" cy="1010653"/>
+            </a:xfrm>
+            <a:prstGeom prst="rect">
+              <a:avLst/>
+            </a:prstGeom>
+          </p:spPr>
+          <p:style>
+            <a:lnRef idx="2">
+              <a:schemeClr val="accent6"/>
+            </a:lnRef>
+            <a:fillRef idx="1">
+              <a:schemeClr val="lt1"/>
+            </a:fillRef>
+            <a:effectRef idx="0">
+              <a:schemeClr val="accent6"/>
+            </a:effectRef>
+            <a:fontRef idx="minor">
+              <a:schemeClr val="dk1"/>
+            </a:fontRef>
+          </p:style>
+          <p:txBody>
+            <a:bodyPr rtlCol="0" anchor="ctr"/>
+            <a:lstStyle/>
+            <a:p>
+              <a:pPr algn="ctr"/>
+              <a:r>
+                <a:rPr lang="en-US" altLang="ko-KR" dirty="0"/>
+                <a:t>Motor</a:t>
+              </a:r>
+              <a:endParaRPr lang="ko-KR" altLang="en-US" dirty="0"/>
+            </a:p>
+          </p:txBody>
+        </p:sp>
+        <p:sp>
+          <p:nvSpPr>
+            <p:cNvPr id="51" name="직사각형 50"/>
+            <p:cNvSpPr/>
+            <p:nvPr/>
+          </p:nvSpPr>
+          <p:spPr>
+            <a:xfrm>
+              <a:off x="5940789" y="2398829"/>
+              <a:ext cx="1097280" cy="1010653"/>
+            </a:xfrm>
+            <a:prstGeom prst="rect">
+              <a:avLst/>
+            </a:prstGeom>
+          </p:spPr>
+          <p:style>
+            <a:lnRef idx="2">
+              <a:schemeClr val="accent6"/>
+            </a:lnRef>
+            <a:fillRef idx="1">
+              <a:schemeClr val="lt1"/>
+            </a:fillRef>
+            <a:effectRef idx="0">
+              <a:schemeClr val="accent6"/>
+            </a:effectRef>
+            <a:fontRef idx="minor">
+              <a:schemeClr val="dk1"/>
+            </a:fontRef>
+          </p:style>
+          <p:txBody>
+            <a:bodyPr rtlCol="0" anchor="ctr"/>
+            <a:lstStyle/>
+            <a:p>
+              <a:pPr algn="ctr"/>
+              <a:r>
+                <a:rPr lang="en-US" altLang="ko-KR" dirty="0"/>
+                <a:t>ESC</a:t>
+              </a:r>
+              <a:endParaRPr lang="ko-KR" altLang="en-US" dirty="0"/>
+            </a:p>
+          </p:txBody>
+        </p:sp>
+        <p:sp>
+          <p:nvSpPr>
+            <p:cNvPr id="52" name="직사각형 51"/>
+            <p:cNvSpPr/>
+            <p:nvPr/>
+          </p:nvSpPr>
+          <p:spPr>
+            <a:xfrm>
+              <a:off x="5940789" y="1166707"/>
+              <a:ext cx="1097280" cy="1010653"/>
+            </a:xfrm>
+            <a:prstGeom prst="rect">
+              <a:avLst/>
+            </a:prstGeom>
+          </p:spPr>
+          <p:style>
+            <a:lnRef idx="2">
+              <a:schemeClr val="accent6"/>
+            </a:lnRef>
+            <a:fillRef idx="1">
+              <a:schemeClr val="lt1"/>
+            </a:fillRef>
+            <a:effectRef idx="0">
+              <a:schemeClr val="accent6"/>
+            </a:effectRef>
+            <a:fontRef idx="minor">
+              <a:schemeClr val="dk1"/>
+            </a:fontRef>
+          </p:style>
+          <p:txBody>
+            <a:bodyPr rtlCol="0" anchor="ctr"/>
+            <a:lstStyle/>
+            <a:p>
+              <a:pPr algn="ctr"/>
+              <a:r>
+                <a:rPr lang="en-US" altLang="ko-KR" dirty="0"/>
+                <a:t>ESC</a:t>
+              </a:r>
+              <a:endParaRPr lang="ko-KR" altLang="en-US" dirty="0"/>
+            </a:p>
+          </p:txBody>
+        </p:sp>
+        <p:sp>
+          <p:nvSpPr>
+            <p:cNvPr id="53" name="직사각형 52"/>
+            <p:cNvSpPr/>
+            <p:nvPr/>
+          </p:nvSpPr>
+          <p:spPr>
+            <a:xfrm>
+              <a:off x="5940789" y="4849373"/>
+              <a:ext cx="1097280" cy="1010653"/>
+            </a:xfrm>
+            <a:prstGeom prst="rect">
+              <a:avLst/>
+            </a:prstGeom>
+          </p:spPr>
+          <p:style>
+            <a:lnRef idx="2">
+              <a:schemeClr val="accent6"/>
+            </a:lnRef>
+            <a:fillRef idx="1">
+              <a:schemeClr val="lt1"/>
+            </a:fillRef>
+            <a:effectRef idx="0">
+              <a:schemeClr val="accent6"/>
+            </a:effectRef>
+            <a:fontRef idx="minor">
+              <a:schemeClr val="dk1"/>
+            </a:fontRef>
+          </p:style>
+          <p:txBody>
+            <a:bodyPr rtlCol="0" anchor="ctr"/>
+            <a:lstStyle/>
+            <a:p>
+              <a:pPr algn="ctr"/>
+              <a:r>
+                <a:rPr lang="en-US" altLang="ko-KR" dirty="0"/>
+                <a:t>ESC</a:t>
+              </a:r>
+              <a:endParaRPr lang="ko-KR" altLang="en-US" dirty="0"/>
+            </a:p>
+          </p:txBody>
+        </p:sp>
+        <p:sp>
+          <p:nvSpPr>
+            <p:cNvPr id="54" name="직사각형 53"/>
+            <p:cNvSpPr/>
+            <p:nvPr/>
+          </p:nvSpPr>
+          <p:spPr>
+            <a:xfrm>
+              <a:off x="5940789" y="3626385"/>
+              <a:ext cx="1097280" cy="1010653"/>
+            </a:xfrm>
+            <a:prstGeom prst="rect">
+              <a:avLst/>
+            </a:prstGeom>
+          </p:spPr>
+          <p:style>
+            <a:lnRef idx="2">
+              <a:schemeClr val="accent6"/>
+            </a:lnRef>
+            <a:fillRef idx="1">
+              <a:schemeClr val="lt1"/>
+            </a:fillRef>
+            <a:effectRef idx="0">
+              <a:schemeClr val="accent6"/>
+            </a:effectRef>
+            <a:fontRef idx="minor">
+              <a:schemeClr val="dk1"/>
+            </a:fontRef>
+          </p:style>
+          <p:txBody>
+            <a:bodyPr rtlCol="0" anchor="ctr"/>
+            <a:lstStyle/>
+            <a:p>
+              <a:pPr algn="ctr"/>
+              <a:r>
+                <a:rPr lang="en-US" altLang="ko-KR" dirty="0"/>
+                <a:t>ESC</a:t>
+              </a:r>
+              <a:endParaRPr lang="ko-KR" altLang="en-US" dirty="0"/>
+            </a:p>
+          </p:txBody>
+        </p:sp>
+        <p:cxnSp>
+          <p:nvCxnSpPr>
+            <p:cNvPr id="60" name="직선 화살표 연결선 59"/>
+            <p:cNvCxnSpPr>
+              <a:stCxn id="4" idx="3"/>
+              <a:endCxn id="51" idx="1"/>
+            </p:cNvCxnSpPr>
+            <p:nvPr/>
+          </p:nvCxnSpPr>
+          <p:spPr>
+            <a:xfrm>
+              <a:off x="3820025" y="2904156"/>
+              <a:ext cx="2120764" cy="0"/>
+            </a:xfrm>
+            <a:prstGeom prst="straightConnector1">
+              <a:avLst/>
+            </a:prstGeom>
+            <a:ln>
+              <a:tailEnd type="triangle"/>
+            </a:ln>
+          </p:spPr>
+          <p:style>
+            <a:lnRef idx="1">
+              <a:schemeClr val="accent1"/>
+            </a:lnRef>
+            <a:fillRef idx="0">
+              <a:schemeClr val="accent1"/>
+            </a:fillRef>
+            <a:effectRef idx="0">
+              <a:schemeClr val="accent1"/>
+            </a:effectRef>
+            <a:fontRef idx="minor">
+              <a:schemeClr val="tx1"/>
+            </a:fontRef>
+          </p:style>
+        </p:cxnSp>
+        <p:cxnSp>
+          <p:nvCxnSpPr>
+            <p:cNvPr id="63" name="직선 화살표 연결선 62"/>
+            <p:cNvCxnSpPr>
+              <a:stCxn id="4" idx="3"/>
+              <a:endCxn id="54" idx="1"/>
+            </p:cNvCxnSpPr>
+            <p:nvPr/>
+          </p:nvCxnSpPr>
+          <p:spPr>
+            <a:xfrm>
+              <a:off x="3820025" y="2904156"/>
+              <a:ext cx="2120764" cy="1227556"/>
+            </a:xfrm>
+            <a:prstGeom prst="straightConnector1">
+              <a:avLst/>
+            </a:prstGeom>
+            <a:ln>
+              <a:tailEnd type="triangle"/>
+            </a:ln>
+          </p:spPr>
+          <p:style>
+            <a:lnRef idx="1">
+              <a:schemeClr val="accent1"/>
+            </a:lnRef>
+            <a:fillRef idx="0">
+              <a:schemeClr val="accent1"/>
+            </a:fillRef>
+            <a:effectRef idx="0">
+              <a:schemeClr val="accent1"/>
+            </a:effectRef>
+            <a:fontRef idx="minor">
+              <a:schemeClr val="tx1"/>
+            </a:fontRef>
+          </p:style>
+        </p:cxnSp>
+        <p:cxnSp>
+          <p:nvCxnSpPr>
+            <p:cNvPr id="66" name="직선 화살표 연결선 65"/>
+            <p:cNvCxnSpPr>
+              <a:stCxn id="4" idx="3"/>
+              <a:endCxn id="53" idx="1"/>
+            </p:cNvCxnSpPr>
+            <p:nvPr/>
+          </p:nvCxnSpPr>
+          <p:spPr>
+            <a:xfrm>
+              <a:off x="3820025" y="2904156"/>
+              <a:ext cx="2120764" cy="2450544"/>
+            </a:xfrm>
+            <a:prstGeom prst="straightConnector1">
+              <a:avLst/>
+            </a:prstGeom>
+            <a:ln>
+              <a:tailEnd type="triangle"/>
+            </a:ln>
+          </p:spPr>
+          <p:style>
+            <a:lnRef idx="1">
+              <a:schemeClr val="accent1"/>
+            </a:lnRef>
+            <a:fillRef idx="0">
+              <a:schemeClr val="accent1"/>
+            </a:fillRef>
+            <a:effectRef idx="0">
+              <a:schemeClr val="accent1"/>
+            </a:effectRef>
+            <a:fontRef idx="minor">
+              <a:schemeClr val="tx1"/>
+            </a:fontRef>
+          </p:style>
+        </p:cxnSp>
+        <p:cxnSp>
+          <p:nvCxnSpPr>
+            <p:cNvPr id="71" name="직선 화살표 연결선 70"/>
+            <p:cNvCxnSpPr>
+              <a:stCxn id="11" idx="3"/>
+              <a:endCxn id="51" idx="1"/>
+            </p:cNvCxnSpPr>
+            <p:nvPr/>
+          </p:nvCxnSpPr>
+          <p:spPr>
+            <a:xfrm flipV="1">
+              <a:off x="4939161" y="2904156"/>
+              <a:ext cx="1001628" cy="2450544"/>
+            </a:xfrm>
+            <a:prstGeom prst="straightConnector1">
+              <a:avLst/>
+            </a:prstGeom>
+            <a:ln>
+              <a:tailEnd type="triangle"/>
+            </a:ln>
+          </p:spPr>
+          <p:style>
+            <a:lnRef idx="1">
+              <a:schemeClr val="accent2"/>
+            </a:lnRef>
+            <a:fillRef idx="0">
+              <a:schemeClr val="accent2"/>
+            </a:fillRef>
+            <a:effectRef idx="0">
+              <a:schemeClr val="accent2"/>
+            </a:effectRef>
+            <a:fontRef idx="minor">
+              <a:schemeClr val="tx1"/>
+            </a:fontRef>
+          </p:style>
+        </p:cxnSp>
+        <p:cxnSp>
+          <p:nvCxnSpPr>
+            <p:cNvPr id="74" name="직선 화살표 연결선 73"/>
+            <p:cNvCxnSpPr>
+              <a:stCxn id="11" idx="3"/>
+              <a:endCxn id="54" idx="1"/>
+            </p:cNvCxnSpPr>
+            <p:nvPr/>
+          </p:nvCxnSpPr>
+          <p:spPr>
+            <a:xfrm flipV="1">
+              <a:off x="4939161" y="4131712"/>
+              <a:ext cx="1001628" cy="1222988"/>
+            </a:xfrm>
+            <a:prstGeom prst="straightConnector1">
+              <a:avLst/>
+            </a:prstGeom>
+            <a:ln>
+              <a:tailEnd type="triangle"/>
+            </a:ln>
+          </p:spPr>
+          <p:style>
+            <a:lnRef idx="1">
+              <a:schemeClr val="accent2"/>
+            </a:lnRef>
+            <a:fillRef idx="0">
+              <a:schemeClr val="accent2"/>
+            </a:fillRef>
+            <a:effectRef idx="0">
+              <a:schemeClr val="accent2"/>
+            </a:effectRef>
+            <a:fontRef idx="minor">
+              <a:schemeClr val="tx1"/>
+            </a:fontRef>
+          </p:style>
+        </p:cxnSp>
+        <p:cxnSp>
+          <p:nvCxnSpPr>
+            <p:cNvPr id="77" name="직선 화살표 연결선 76"/>
+            <p:cNvCxnSpPr>
+              <a:stCxn id="11" idx="3"/>
+              <a:endCxn id="53" idx="1"/>
+            </p:cNvCxnSpPr>
+            <p:nvPr/>
+          </p:nvCxnSpPr>
+          <p:spPr>
+            <a:xfrm>
+              <a:off x="4939161" y="5354700"/>
+              <a:ext cx="1001628" cy="0"/>
+            </a:xfrm>
+            <a:prstGeom prst="straightConnector1">
+              <a:avLst/>
+            </a:prstGeom>
+            <a:ln>
+              <a:tailEnd type="triangle"/>
+            </a:ln>
+          </p:spPr>
+          <p:style>
+            <a:lnRef idx="1">
+              <a:schemeClr val="accent2"/>
+            </a:lnRef>
+            <a:fillRef idx="0">
+              <a:schemeClr val="accent2"/>
+            </a:fillRef>
+            <a:effectRef idx="0">
+              <a:schemeClr val="accent2"/>
+            </a:effectRef>
+            <a:fontRef idx="minor">
+              <a:schemeClr val="tx1"/>
+            </a:fontRef>
+          </p:style>
+        </p:cxnSp>
+        <p:cxnSp>
+          <p:nvCxnSpPr>
+            <p:cNvPr id="89" name="직선 화살표 연결선 88"/>
+            <p:cNvCxnSpPr>
+              <a:stCxn id="11" idx="0"/>
+              <a:endCxn id="4" idx="2"/>
+            </p:cNvCxnSpPr>
+            <p:nvPr/>
+          </p:nvCxnSpPr>
+          <p:spPr>
+            <a:xfrm flipH="1" flipV="1">
+              <a:off x="3271385" y="3409482"/>
+              <a:ext cx="1119136" cy="1439891"/>
+            </a:xfrm>
+            <a:prstGeom prst="straightConnector1">
+              <a:avLst/>
+            </a:prstGeom>
+            <a:ln>
+              <a:tailEnd type="triangle"/>
+            </a:ln>
+          </p:spPr>
+          <p:style>
+            <a:lnRef idx="1">
+              <a:schemeClr val="accent2"/>
+            </a:lnRef>
+            <a:fillRef idx="0">
+              <a:schemeClr val="accent2"/>
+            </a:fillRef>
+            <a:effectRef idx="0">
+              <a:schemeClr val="accent2"/>
+            </a:effectRef>
+            <a:fontRef idx="minor">
+              <a:schemeClr val="tx1"/>
+            </a:fontRef>
+          </p:style>
+        </p:cxnSp>
+        <p:cxnSp>
+          <p:nvCxnSpPr>
+            <p:cNvPr id="91" name="직선 화살표 연결선 90"/>
+            <p:cNvCxnSpPr>
+              <a:stCxn id="52" idx="3"/>
+              <a:endCxn id="42" idx="1"/>
+            </p:cNvCxnSpPr>
+            <p:nvPr/>
+          </p:nvCxnSpPr>
+          <p:spPr>
+            <a:xfrm>
+              <a:off x="7038069" y="1672034"/>
+              <a:ext cx="497308" cy="0"/>
+            </a:xfrm>
+            <a:prstGeom prst="straightConnector1">
+              <a:avLst/>
+            </a:prstGeom>
+            <a:ln>
+              <a:tailEnd type="triangle"/>
+            </a:ln>
+          </p:spPr>
+          <p:style>
+            <a:lnRef idx="1">
+              <a:schemeClr val="accent2"/>
+            </a:lnRef>
+            <a:fillRef idx="0">
+              <a:schemeClr val="accent2"/>
+            </a:fillRef>
+            <a:effectRef idx="0">
+              <a:schemeClr val="accent2"/>
+            </a:effectRef>
+            <a:fontRef idx="minor">
+              <a:schemeClr val="tx1"/>
+            </a:fontRef>
+          </p:style>
+        </p:cxnSp>
+        <p:cxnSp>
+          <p:nvCxnSpPr>
+            <p:cNvPr id="93" name="직선 화살표 연결선 92"/>
+            <p:cNvCxnSpPr>
+              <a:stCxn id="51" idx="3"/>
+              <a:endCxn id="7" idx="1"/>
+            </p:cNvCxnSpPr>
+            <p:nvPr/>
+          </p:nvCxnSpPr>
+          <p:spPr>
+            <a:xfrm>
+              <a:off x="7038069" y="2904156"/>
+              <a:ext cx="497308" cy="0"/>
+            </a:xfrm>
+            <a:prstGeom prst="straightConnector1">
+              <a:avLst/>
+            </a:prstGeom>
+            <a:ln>
+              <a:tailEnd type="triangle"/>
+            </a:ln>
+          </p:spPr>
+          <p:style>
+            <a:lnRef idx="1">
+              <a:schemeClr val="accent2"/>
+            </a:lnRef>
+            <a:fillRef idx="0">
+              <a:schemeClr val="accent2"/>
+            </a:fillRef>
+            <a:effectRef idx="0">
+              <a:schemeClr val="accent2"/>
+            </a:effectRef>
+            <a:fontRef idx="minor">
+              <a:schemeClr val="tx1"/>
+            </a:fontRef>
+          </p:style>
+        </p:cxnSp>
+        <p:cxnSp>
+          <p:nvCxnSpPr>
+            <p:cNvPr id="95" name="직선 화살표 연결선 94"/>
+            <p:cNvCxnSpPr>
+              <a:stCxn id="54" idx="3"/>
+              <a:endCxn id="46" idx="1"/>
+            </p:cNvCxnSpPr>
+            <p:nvPr/>
+          </p:nvCxnSpPr>
+          <p:spPr>
+            <a:xfrm>
+              <a:off x="7038069" y="4131712"/>
+              <a:ext cx="497308" cy="0"/>
+            </a:xfrm>
+            <a:prstGeom prst="straightConnector1">
+              <a:avLst/>
+            </a:prstGeom>
+            <a:ln>
+              <a:tailEnd type="triangle"/>
+            </a:ln>
+          </p:spPr>
+          <p:style>
+            <a:lnRef idx="1">
+              <a:schemeClr val="accent2"/>
+            </a:lnRef>
+            <a:fillRef idx="0">
+              <a:schemeClr val="accent2"/>
+            </a:fillRef>
+            <a:effectRef idx="0">
+              <a:schemeClr val="accent2"/>
+            </a:effectRef>
+            <a:fontRef idx="minor">
+              <a:schemeClr val="tx1"/>
+            </a:fontRef>
+          </p:style>
+        </p:cxnSp>
+        <p:cxnSp>
+          <p:nvCxnSpPr>
+            <p:cNvPr id="97" name="직선 화살표 연결선 96"/>
+            <p:cNvCxnSpPr>
+              <a:stCxn id="53" idx="3"/>
+              <a:endCxn id="45" idx="1"/>
+            </p:cNvCxnSpPr>
+            <p:nvPr/>
+          </p:nvCxnSpPr>
+          <p:spPr>
+            <a:xfrm>
+              <a:off x="7038069" y="5354700"/>
+              <a:ext cx="497308" cy="0"/>
+            </a:xfrm>
+            <a:prstGeom prst="straightConnector1">
+              <a:avLst/>
+            </a:prstGeom>
+            <a:ln>
+              <a:tailEnd type="triangle"/>
+            </a:ln>
+          </p:spPr>
+          <p:style>
+            <a:lnRef idx="1">
+              <a:schemeClr val="accent2"/>
+            </a:lnRef>
+            <a:fillRef idx="0">
+              <a:schemeClr val="accent2"/>
+            </a:fillRef>
+            <a:effectRef idx="0">
+              <a:schemeClr val="accent2"/>
+            </a:effectRef>
+            <a:fontRef idx="minor">
+              <a:schemeClr val="tx1"/>
+            </a:fontRef>
+          </p:style>
+        </p:cxnSp>
+      </p:grpSp>
     </p:spTree>
     <p:extLst>
       <p:ext uri="{BB962C8B-B14F-4D97-AF65-F5344CB8AC3E}">
@@ -5075,303 +5093,13 @@
       </p:sp>
       <p:sp>
         <p:nvSpPr>
-          <p:cNvPr id="4" name="직사각형 3"/>
-          <p:cNvSpPr/>
-          <p:nvPr/>
-        </p:nvSpPr>
-        <p:spPr>
-          <a:xfrm>
-            <a:off x="1694045" y="3946357"/>
-            <a:ext cx="1097280" cy="1010653"/>
-          </a:xfrm>
-          <a:prstGeom prst="rect">
-            <a:avLst/>
-          </a:prstGeom>
-        </p:spPr>
-        <p:style>
-          <a:lnRef idx="2">
-            <a:schemeClr val="accent6"/>
-          </a:lnRef>
-          <a:fillRef idx="1">
-            <a:schemeClr val="lt1"/>
-          </a:fillRef>
-          <a:effectRef idx="0">
-            <a:schemeClr val="accent6"/>
-          </a:effectRef>
-          <a:fontRef idx="minor">
-            <a:schemeClr val="dk1"/>
-          </a:fontRef>
-        </p:style>
-        <p:txBody>
-          <a:bodyPr rtlCol="0" anchor="ctr"/>
-          <a:lstStyle/>
-          <a:p>
-            <a:pPr algn="ctr"/>
-            <a:r>
-              <a:rPr lang="en-US" altLang="ko-KR" dirty="0"/>
-              <a:t>Arduino</a:t>
-            </a:r>
-            <a:br>
-              <a:rPr lang="en-US" altLang="ko-KR" dirty="0"/>
-            </a:br>
-            <a:r>
-              <a:rPr lang="en-US" altLang="ko-KR" dirty="0"/>
-              <a:t>Board</a:t>
-            </a:r>
-            <a:endParaRPr lang="ko-KR" altLang="en-US" dirty="0"/>
-          </a:p>
-        </p:txBody>
-      </p:sp>
-      <p:sp>
-        <p:nvSpPr>
-          <p:cNvPr id="5" name="직사각형 4"/>
-          <p:cNvSpPr/>
-          <p:nvPr/>
-        </p:nvSpPr>
-        <p:spPr>
-          <a:xfrm>
-            <a:off x="4100361" y="3946357"/>
-            <a:ext cx="1097280" cy="1010653"/>
-          </a:xfrm>
-          <a:prstGeom prst="rect">
-            <a:avLst/>
-          </a:prstGeom>
-        </p:spPr>
-        <p:style>
-          <a:lnRef idx="2">
-            <a:schemeClr val="accent6"/>
-          </a:lnRef>
-          <a:fillRef idx="1">
-            <a:schemeClr val="lt1"/>
-          </a:fillRef>
-          <a:effectRef idx="0">
-            <a:schemeClr val="accent6"/>
-          </a:effectRef>
-          <a:fontRef idx="minor">
-            <a:schemeClr val="dk1"/>
-          </a:fontRef>
-        </p:style>
-        <p:txBody>
-          <a:bodyPr rtlCol="0" anchor="ctr"/>
-          <a:lstStyle/>
-          <a:p>
-            <a:pPr algn="ctr"/>
-            <a:r>
-              <a:rPr lang="en-US" altLang="ko-KR" dirty="0"/>
-              <a:t>ESC</a:t>
-            </a:r>
-            <a:endParaRPr lang="ko-KR" altLang="en-US" dirty="0"/>
-          </a:p>
-        </p:txBody>
-      </p:sp>
-      <p:sp>
-        <p:nvSpPr>
-          <p:cNvPr id="6" name="직사각형 5"/>
-          <p:cNvSpPr/>
-          <p:nvPr/>
-        </p:nvSpPr>
-        <p:spPr>
-          <a:xfrm>
-            <a:off x="1694045" y="5411753"/>
-            <a:ext cx="1097280" cy="1010653"/>
-          </a:xfrm>
-          <a:prstGeom prst="rect">
-            <a:avLst/>
-          </a:prstGeom>
-        </p:spPr>
-        <p:style>
-          <a:lnRef idx="2">
-            <a:schemeClr val="accent6"/>
-          </a:lnRef>
-          <a:fillRef idx="1">
-            <a:schemeClr val="lt1"/>
-          </a:fillRef>
-          <a:effectRef idx="0">
-            <a:schemeClr val="accent6"/>
-          </a:effectRef>
-          <a:fontRef idx="minor">
-            <a:schemeClr val="dk1"/>
-          </a:fontRef>
-        </p:style>
-        <p:txBody>
-          <a:bodyPr rtlCol="0" anchor="ctr"/>
-          <a:lstStyle/>
-          <a:p>
-            <a:pPr algn="ctr"/>
-            <a:r>
-              <a:rPr lang="en-US" altLang="ko-KR" dirty="0"/>
-              <a:t>Gyro</a:t>
-            </a:r>
-          </a:p>
-          <a:p>
-            <a:pPr algn="ctr"/>
-            <a:r>
-              <a:rPr lang="en-US" altLang="ko-KR" dirty="0"/>
-              <a:t>Sensor</a:t>
-            </a:r>
-            <a:endParaRPr lang="ko-KR" altLang="en-US" dirty="0"/>
-          </a:p>
-        </p:txBody>
-      </p:sp>
-      <p:sp>
-        <p:nvSpPr>
-          <p:cNvPr id="7" name="직사각형 6"/>
-          <p:cNvSpPr/>
-          <p:nvPr/>
-        </p:nvSpPr>
-        <p:spPr>
-          <a:xfrm>
-            <a:off x="6506677" y="3946357"/>
-            <a:ext cx="1097280" cy="1010653"/>
-          </a:xfrm>
-          <a:prstGeom prst="rect">
-            <a:avLst/>
-          </a:prstGeom>
-        </p:spPr>
-        <p:style>
-          <a:lnRef idx="2">
-            <a:schemeClr val="accent6"/>
-          </a:lnRef>
-          <a:fillRef idx="1">
-            <a:schemeClr val="lt1"/>
-          </a:fillRef>
-          <a:effectRef idx="0">
-            <a:schemeClr val="accent6"/>
-          </a:effectRef>
-          <a:fontRef idx="minor">
-            <a:schemeClr val="dk1"/>
-          </a:fontRef>
-        </p:style>
-        <p:txBody>
-          <a:bodyPr rtlCol="0" anchor="ctr"/>
-          <a:lstStyle/>
-          <a:p>
-            <a:pPr algn="ctr"/>
-            <a:r>
-              <a:rPr lang="en-US" altLang="ko-KR" dirty="0"/>
-              <a:t>Motor</a:t>
-            </a:r>
-            <a:endParaRPr lang="ko-KR" altLang="en-US" dirty="0"/>
-          </a:p>
-        </p:txBody>
-      </p:sp>
-      <p:cxnSp>
-        <p:nvCxnSpPr>
-          <p:cNvPr id="9" name="직선 화살표 연결선 8"/>
-          <p:cNvCxnSpPr>
-            <a:stCxn id="6" idx="0"/>
-            <a:endCxn id="4" idx="2"/>
-          </p:cNvCxnSpPr>
-          <p:nvPr/>
-        </p:nvCxnSpPr>
-        <p:spPr>
-          <a:xfrm flipV="1">
-            <a:off x="2242685" y="4957010"/>
-            <a:ext cx="0" cy="454743"/>
-          </a:xfrm>
-          <a:prstGeom prst="straightConnector1">
-            <a:avLst/>
-          </a:prstGeom>
-          <a:ln>
-            <a:tailEnd type="triangle"/>
-          </a:ln>
-        </p:spPr>
-        <p:style>
-          <a:lnRef idx="1">
-            <a:schemeClr val="accent1"/>
-          </a:lnRef>
-          <a:fillRef idx="0">
-            <a:schemeClr val="accent1"/>
-          </a:fillRef>
-          <a:effectRef idx="0">
-            <a:schemeClr val="accent1"/>
-          </a:effectRef>
-          <a:fontRef idx="minor">
-            <a:schemeClr val="tx1"/>
-          </a:fontRef>
-        </p:style>
-      </p:cxnSp>
-      <p:cxnSp>
-        <p:nvCxnSpPr>
-          <p:cNvPr id="11" name="직선 화살표 연결선 10"/>
-          <p:cNvCxnSpPr>
-            <a:stCxn id="4" idx="3"/>
-            <a:endCxn id="5" idx="1"/>
-          </p:cNvCxnSpPr>
-          <p:nvPr/>
-        </p:nvCxnSpPr>
-        <p:spPr>
-          <a:xfrm>
-            <a:off x="2791325" y="4451684"/>
-            <a:ext cx="1309036" cy="0"/>
-          </a:xfrm>
-          <a:prstGeom prst="straightConnector1">
-            <a:avLst/>
-          </a:prstGeom>
-          <a:ln>
-            <a:tailEnd type="triangle"/>
-          </a:ln>
-        </p:spPr>
-        <p:style>
-          <a:lnRef idx="1">
-            <a:schemeClr val="accent1"/>
-          </a:lnRef>
-          <a:fillRef idx="0">
-            <a:schemeClr val="accent1"/>
-          </a:fillRef>
-          <a:effectRef idx="0">
-            <a:schemeClr val="accent1"/>
-          </a:effectRef>
-          <a:fontRef idx="minor">
-            <a:schemeClr val="tx1"/>
-          </a:fontRef>
-        </p:style>
-      </p:cxnSp>
-      <p:cxnSp>
-        <p:nvCxnSpPr>
-          <p:cNvPr id="13" name="직선 화살표 연결선 12"/>
-          <p:cNvCxnSpPr>
-            <a:stCxn id="5" idx="3"/>
-            <a:endCxn id="7" idx="1"/>
-          </p:cNvCxnSpPr>
-          <p:nvPr/>
-        </p:nvCxnSpPr>
-        <p:spPr>
-          <a:xfrm>
-            <a:off x="5197641" y="4451684"/>
-            <a:ext cx="1309036" cy="0"/>
-          </a:xfrm>
-          <a:prstGeom prst="straightConnector1">
-            <a:avLst/>
-          </a:prstGeom>
-          <a:ln>
-            <a:tailEnd type="triangle"/>
-          </a:ln>
-        </p:spPr>
-        <p:style>
-          <a:lnRef idx="1">
-            <a:schemeClr val="accent2"/>
-          </a:lnRef>
-          <a:fillRef idx="0">
-            <a:schemeClr val="accent2"/>
-          </a:fillRef>
-          <a:effectRef idx="0">
-            <a:schemeClr val="accent2"/>
-          </a:effectRef>
-          <a:fontRef idx="minor">
-            <a:schemeClr val="tx1"/>
-          </a:fontRef>
-        </p:style>
-      </p:cxnSp>
-      <p:sp>
-        <p:nvSpPr>
           <p:cNvPr id="14" name="TextBox 13"/>
           <p:cNvSpPr txBox="1"/>
           <p:nvPr/>
         </p:nvSpPr>
         <p:spPr>
           <a:xfrm>
-            <a:off x="8523972" y="4707125"/>
+            <a:off x="9310838" y="4356845"/>
             <a:ext cx="2454442" cy="1200329"/>
           </a:xfrm>
           <a:prstGeom prst="rect">
@@ -5410,119 +5138,502 @@
           </a:p>
         </p:txBody>
       </p:sp>
-      <p:sp>
-        <p:nvSpPr>
-          <p:cNvPr id="19" name="직사각형 18"/>
-          <p:cNvSpPr/>
+      <p:grpSp>
+        <p:nvGrpSpPr>
+          <p:cNvPr id="8" name="그룹 7"/>
+          <p:cNvGrpSpPr/>
           <p:nvPr/>
-        </p:nvSpPr>
-        <p:spPr>
+        </p:nvGrpSpPr>
+        <p:grpSpPr>
           <a:xfrm>
-            <a:off x="4100361" y="5411753"/>
-            <a:ext cx="1097280" cy="1010653"/>
+            <a:off x="940754" y="3946357"/>
+            <a:ext cx="7830152" cy="2476049"/>
+            <a:chOff x="940754" y="3946357"/>
+            <a:chExt cx="7830152" cy="2476049"/>
           </a:xfrm>
-          <a:prstGeom prst="rect">
-            <a:avLst/>
-          </a:prstGeom>
-        </p:spPr>
-        <p:style>
-          <a:lnRef idx="2">
-            <a:schemeClr val="accent6"/>
-          </a:lnRef>
-          <a:fillRef idx="1">
-            <a:schemeClr val="lt1"/>
-          </a:fillRef>
-          <a:effectRef idx="0">
-            <a:schemeClr val="accent6"/>
-          </a:effectRef>
-          <a:fontRef idx="minor">
-            <a:schemeClr val="dk1"/>
-          </a:fontRef>
-        </p:style>
-        <p:txBody>
-          <a:bodyPr rtlCol="0" anchor="ctr"/>
-          <a:lstStyle/>
-          <a:p>
-            <a:pPr algn="ctr"/>
-            <a:r>
-              <a:rPr lang="en-US" altLang="ko-KR" dirty="0"/>
-              <a:t>Battery</a:t>
-            </a:r>
-            <a:endParaRPr lang="ko-KR" altLang="en-US" dirty="0"/>
-          </a:p>
-        </p:txBody>
-      </p:sp>
-      <p:cxnSp>
-        <p:nvCxnSpPr>
-          <p:cNvPr id="21" name="직선 화살표 연결선 20"/>
-          <p:cNvCxnSpPr>
-            <a:stCxn id="19" idx="0"/>
-            <a:endCxn id="5" idx="2"/>
-          </p:cNvCxnSpPr>
-          <p:nvPr/>
-        </p:nvCxnSpPr>
-        <p:spPr>
-          <a:xfrm flipV="1">
-            <a:off x="4649001" y="4957010"/>
-            <a:ext cx="0" cy="454743"/>
-          </a:xfrm>
-          <a:prstGeom prst="straightConnector1">
-            <a:avLst/>
-          </a:prstGeom>
-          <a:ln>
-            <a:tailEnd type="triangle"/>
-          </a:ln>
-        </p:spPr>
-        <p:style>
-          <a:lnRef idx="1">
-            <a:schemeClr val="accent2"/>
-          </a:lnRef>
-          <a:fillRef idx="0">
-            <a:schemeClr val="accent2"/>
-          </a:fillRef>
-          <a:effectRef idx="0">
-            <a:schemeClr val="accent2"/>
-          </a:effectRef>
-          <a:fontRef idx="minor">
-            <a:schemeClr val="tx1"/>
-          </a:fontRef>
-        </p:style>
-      </p:cxnSp>
-      <p:cxnSp>
-        <p:nvCxnSpPr>
-          <p:cNvPr id="23" name="직선 화살표 연결선 22"/>
-          <p:cNvCxnSpPr>
-            <a:stCxn id="19" idx="1"/>
-          </p:cNvCxnSpPr>
-          <p:nvPr/>
-        </p:nvCxnSpPr>
-        <p:spPr>
-          <a:xfrm flipH="1" flipV="1">
-            <a:off x="2791325" y="4822256"/>
-            <a:ext cx="1309036" cy="1094824"/>
-          </a:xfrm>
-          <a:prstGeom prst="straightConnector1">
-            <a:avLst/>
-          </a:prstGeom>
-          <a:ln>
-            <a:tailEnd type="triangle"/>
-          </a:ln>
-        </p:spPr>
-        <p:style>
-          <a:lnRef idx="1">
-            <a:schemeClr val="accent2"/>
-          </a:lnRef>
-          <a:fillRef idx="0">
-            <a:schemeClr val="accent2"/>
-          </a:fillRef>
-          <a:effectRef idx="0">
-            <a:schemeClr val="accent2"/>
-          </a:effectRef>
-          <a:fontRef idx="minor">
-            <a:schemeClr val="tx1"/>
-          </a:fontRef>
-        </p:style>
-      </p:cxnSp>
+        </p:grpSpPr>
+        <p:sp>
+          <p:nvSpPr>
+            <p:cNvPr id="4" name="직사각형 3"/>
+            <p:cNvSpPr/>
+            <p:nvPr/>
+          </p:nvSpPr>
+          <p:spPr>
+            <a:xfrm>
+              <a:off x="2860994" y="3946357"/>
+              <a:ext cx="1097280" cy="1010653"/>
+            </a:xfrm>
+            <a:prstGeom prst="rect">
+              <a:avLst/>
+            </a:prstGeom>
+          </p:spPr>
+          <p:style>
+            <a:lnRef idx="2">
+              <a:schemeClr val="accent6"/>
+            </a:lnRef>
+            <a:fillRef idx="1">
+              <a:schemeClr val="lt1"/>
+            </a:fillRef>
+            <a:effectRef idx="0">
+              <a:schemeClr val="accent6"/>
+            </a:effectRef>
+            <a:fontRef idx="minor">
+              <a:schemeClr val="dk1"/>
+            </a:fontRef>
+          </p:style>
+          <p:txBody>
+            <a:bodyPr rtlCol="0" anchor="ctr"/>
+            <a:lstStyle/>
+            <a:p>
+              <a:pPr algn="ctr"/>
+              <a:r>
+                <a:rPr lang="en-US" altLang="ko-KR" dirty="0"/>
+                <a:t>Arduino</a:t>
+              </a:r>
+              <a:br>
+                <a:rPr lang="en-US" altLang="ko-KR" dirty="0"/>
+              </a:br>
+              <a:r>
+                <a:rPr lang="en-US" altLang="ko-KR" dirty="0"/>
+                <a:t>Board</a:t>
+              </a:r>
+              <a:endParaRPr lang="ko-KR" altLang="en-US" dirty="0"/>
+            </a:p>
+          </p:txBody>
+        </p:sp>
+        <p:sp>
+          <p:nvSpPr>
+            <p:cNvPr id="5" name="직사각형 4"/>
+            <p:cNvSpPr/>
+            <p:nvPr/>
+          </p:nvSpPr>
+          <p:spPr>
+            <a:xfrm>
+              <a:off x="5267310" y="3946357"/>
+              <a:ext cx="1097280" cy="1010653"/>
+            </a:xfrm>
+            <a:prstGeom prst="rect">
+              <a:avLst/>
+            </a:prstGeom>
+          </p:spPr>
+          <p:style>
+            <a:lnRef idx="2">
+              <a:schemeClr val="accent6"/>
+            </a:lnRef>
+            <a:fillRef idx="1">
+              <a:schemeClr val="lt1"/>
+            </a:fillRef>
+            <a:effectRef idx="0">
+              <a:schemeClr val="accent6"/>
+            </a:effectRef>
+            <a:fontRef idx="minor">
+              <a:schemeClr val="dk1"/>
+            </a:fontRef>
+          </p:style>
+          <p:txBody>
+            <a:bodyPr rtlCol="0" anchor="ctr"/>
+            <a:lstStyle/>
+            <a:p>
+              <a:pPr algn="ctr"/>
+              <a:r>
+                <a:rPr lang="en-US" altLang="ko-KR" dirty="0"/>
+                <a:t>ESC</a:t>
+              </a:r>
+              <a:endParaRPr lang="ko-KR" altLang="en-US" dirty="0"/>
+            </a:p>
+          </p:txBody>
+        </p:sp>
+        <p:sp>
+          <p:nvSpPr>
+            <p:cNvPr id="6" name="직사각형 5"/>
+            <p:cNvSpPr/>
+            <p:nvPr/>
+          </p:nvSpPr>
+          <p:spPr>
+            <a:xfrm>
+              <a:off x="2860994" y="5411753"/>
+              <a:ext cx="1097280" cy="1010653"/>
+            </a:xfrm>
+            <a:prstGeom prst="rect">
+              <a:avLst/>
+            </a:prstGeom>
+          </p:spPr>
+          <p:style>
+            <a:lnRef idx="2">
+              <a:schemeClr val="accent6"/>
+            </a:lnRef>
+            <a:fillRef idx="1">
+              <a:schemeClr val="lt1"/>
+            </a:fillRef>
+            <a:effectRef idx="0">
+              <a:schemeClr val="accent6"/>
+            </a:effectRef>
+            <a:fontRef idx="minor">
+              <a:schemeClr val="dk1"/>
+            </a:fontRef>
+          </p:style>
+          <p:txBody>
+            <a:bodyPr rtlCol="0" anchor="ctr"/>
+            <a:lstStyle/>
+            <a:p>
+              <a:pPr algn="ctr"/>
+              <a:r>
+                <a:rPr lang="en-US" altLang="ko-KR" dirty="0"/>
+                <a:t>Gyro</a:t>
+              </a:r>
+            </a:p>
+            <a:p>
+              <a:pPr algn="ctr"/>
+              <a:r>
+                <a:rPr lang="en-US" altLang="ko-KR" dirty="0"/>
+                <a:t>Sensor</a:t>
+              </a:r>
+              <a:endParaRPr lang="ko-KR" altLang="en-US" dirty="0"/>
+            </a:p>
+          </p:txBody>
+        </p:sp>
+        <p:sp>
+          <p:nvSpPr>
+            <p:cNvPr id="7" name="직사각형 6"/>
+            <p:cNvSpPr/>
+            <p:nvPr/>
+          </p:nvSpPr>
+          <p:spPr>
+            <a:xfrm>
+              <a:off x="7673626" y="3946357"/>
+              <a:ext cx="1097280" cy="1010653"/>
+            </a:xfrm>
+            <a:prstGeom prst="rect">
+              <a:avLst/>
+            </a:prstGeom>
+          </p:spPr>
+          <p:style>
+            <a:lnRef idx="2">
+              <a:schemeClr val="accent6"/>
+            </a:lnRef>
+            <a:fillRef idx="1">
+              <a:schemeClr val="lt1"/>
+            </a:fillRef>
+            <a:effectRef idx="0">
+              <a:schemeClr val="accent6"/>
+            </a:effectRef>
+            <a:fontRef idx="minor">
+              <a:schemeClr val="dk1"/>
+            </a:fontRef>
+          </p:style>
+          <p:txBody>
+            <a:bodyPr rtlCol="0" anchor="ctr"/>
+            <a:lstStyle/>
+            <a:p>
+              <a:pPr algn="ctr"/>
+              <a:r>
+                <a:rPr lang="en-US" altLang="ko-KR" dirty="0"/>
+                <a:t>Motor</a:t>
+              </a:r>
+              <a:endParaRPr lang="ko-KR" altLang="en-US" dirty="0"/>
+            </a:p>
+          </p:txBody>
+        </p:sp>
+        <p:cxnSp>
+          <p:nvCxnSpPr>
+            <p:cNvPr id="9" name="직선 화살표 연결선 8"/>
+            <p:cNvCxnSpPr>
+              <a:stCxn id="6" idx="0"/>
+              <a:endCxn id="4" idx="2"/>
+            </p:cNvCxnSpPr>
+            <p:nvPr/>
+          </p:nvCxnSpPr>
+          <p:spPr>
+            <a:xfrm flipV="1">
+              <a:off x="3409634" y="4957010"/>
+              <a:ext cx="0" cy="454743"/>
+            </a:xfrm>
+            <a:prstGeom prst="straightConnector1">
+              <a:avLst/>
+            </a:prstGeom>
+            <a:ln>
+              <a:tailEnd type="triangle"/>
+            </a:ln>
+          </p:spPr>
+          <p:style>
+            <a:lnRef idx="1">
+              <a:schemeClr val="accent1"/>
+            </a:lnRef>
+            <a:fillRef idx="0">
+              <a:schemeClr val="accent1"/>
+            </a:fillRef>
+            <a:effectRef idx="0">
+              <a:schemeClr val="accent1"/>
+            </a:effectRef>
+            <a:fontRef idx="minor">
+              <a:schemeClr val="tx1"/>
+            </a:fontRef>
+          </p:style>
+        </p:cxnSp>
+        <p:cxnSp>
+          <p:nvCxnSpPr>
+            <p:cNvPr id="11" name="직선 화살표 연결선 10"/>
+            <p:cNvCxnSpPr>
+              <a:stCxn id="4" idx="3"/>
+              <a:endCxn id="5" idx="1"/>
+            </p:cNvCxnSpPr>
+            <p:nvPr/>
+          </p:nvCxnSpPr>
+          <p:spPr>
+            <a:xfrm>
+              <a:off x="3958274" y="4451684"/>
+              <a:ext cx="1309036" cy="0"/>
+            </a:xfrm>
+            <a:prstGeom prst="straightConnector1">
+              <a:avLst/>
+            </a:prstGeom>
+            <a:ln>
+              <a:tailEnd type="triangle"/>
+            </a:ln>
+          </p:spPr>
+          <p:style>
+            <a:lnRef idx="1">
+              <a:schemeClr val="accent1"/>
+            </a:lnRef>
+            <a:fillRef idx="0">
+              <a:schemeClr val="accent1"/>
+            </a:fillRef>
+            <a:effectRef idx="0">
+              <a:schemeClr val="accent1"/>
+            </a:effectRef>
+            <a:fontRef idx="minor">
+              <a:schemeClr val="tx1"/>
+            </a:fontRef>
+          </p:style>
+        </p:cxnSp>
+        <p:cxnSp>
+          <p:nvCxnSpPr>
+            <p:cNvPr id="13" name="직선 화살표 연결선 12"/>
+            <p:cNvCxnSpPr>
+              <a:stCxn id="5" idx="3"/>
+              <a:endCxn id="7" idx="1"/>
+            </p:cNvCxnSpPr>
+            <p:nvPr/>
+          </p:nvCxnSpPr>
+          <p:spPr>
+            <a:xfrm>
+              <a:off x="6364590" y="4451684"/>
+              <a:ext cx="1309036" cy="0"/>
+            </a:xfrm>
+            <a:prstGeom prst="straightConnector1">
+              <a:avLst/>
+            </a:prstGeom>
+            <a:ln>
+              <a:tailEnd type="triangle"/>
+            </a:ln>
+          </p:spPr>
+          <p:style>
+            <a:lnRef idx="1">
+              <a:schemeClr val="accent2"/>
+            </a:lnRef>
+            <a:fillRef idx="0">
+              <a:schemeClr val="accent2"/>
+            </a:fillRef>
+            <a:effectRef idx="0">
+              <a:schemeClr val="accent2"/>
+            </a:effectRef>
+            <a:fontRef idx="minor">
+              <a:schemeClr val="tx1"/>
+            </a:fontRef>
+          </p:style>
+        </p:cxnSp>
+        <p:sp>
+          <p:nvSpPr>
+            <p:cNvPr id="19" name="직사각형 18"/>
+            <p:cNvSpPr/>
+            <p:nvPr/>
+          </p:nvSpPr>
+          <p:spPr>
+            <a:xfrm>
+              <a:off x="5267310" y="5411753"/>
+              <a:ext cx="1097280" cy="1010653"/>
+            </a:xfrm>
+            <a:prstGeom prst="rect">
+              <a:avLst/>
+            </a:prstGeom>
+          </p:spPr>
+          <p:style>
+            <a:lnRef idx="2">
+              <a:schemeClr val="accent6"/>
+            </a:lnRef>
+            <a:fillRef idx="1">
+              <a:schemeClr val="lt1"/>
+            </a:fillRef>
+            <a:effectRef idx="0">
+              <a:schemeClr val="accent6"/>
+            </a:effectRef>
+            <a:fontRef idx="minor">
+              <a:schemeClr val="dk1"/>
+            </a:fontRef>
+          </p:style>
+          <p:txBody>
+            <a:bodyPr rtlCol="0" anchor="ctr"/>
+            <a:lstStyle/>
+            <a:p>
+              <a:pPr algn="ctr"/>
+              <a:r>
+                <a:rPr lang="en-US" altLang="ko-KR" dirty="0"/>
+                <a:t>Battery</a:t>
+              </a:r>
+              <a:endParaRPr lang="ko-KR" altLang="en-US" dirty="0"/>
+            </a:p>
+          </p:txBody>
+        </p:sp>
+        <p:cxnSp>
+          <p:nvCxnSpPr>
+            <p:cNvPr id="21" name="직선 화살표 연결선 20"/>
+            <p:cNvCxnSpPr>
+              <a:stCxn id="19" idx="0"/>
+              <a:endCxn id="5" idx="2"/>
+            </p:cNvCxnSpPr>
+            <p:nvPr/>
+          </p:nvCxnSpPr>
+          <p:spPr>
+            <a:xfrm flipV="1">
+              <a:off x="5815950" y="4957010"/>
+              <a:ext cx="0" cy="454743"/>
+            </a:xfrm>
+            <a:prstGeom prst="straightConnector1">
+              <a:avLst/>
+            </a:prstGeom>
+            <a:ln>
+              <a:tailEnd type="triangle"/>
+            </a:ln>
+          </p:spPr>
+          <p:style>
+            <a:lnRef idx="1">
+              <a:schemeClr val="accent2"/>
+            </a:lnRef>
+            <a:fillRef idx="0">
+              <a:schemeClr val="accent2"/>
+            </a:fillRef>
+            <a:effectRef idx="0">
+              <a:schemeClr val="accent2"/>
+            </a:effectRef>
+            <a:fontRef idx="minor">
+              <a:schemeClr val="tx1"/>
+            </a:fontRef>
+          </p:style>
+        </p:cxnSp>
+        <p:cxnSp>
+          <p:nvCxnSpPr>
+            <p:cNvPr id="23" name="직선 화살표 연결선 22"/>
+            <p:cNvCxnSpPr>
+              <a:stCxn id="19" idx="1"/>
+            </p:cNvCxnSpPr>
+            <p:nvPr/>
+          </p:nvCxnSpPr>
+          <p:spPr>
+            <a:xfrm flipH="1" flipV="1">
+              <a:off x="3958274" y="4822256"/>
+              <a:ext cx="1309036" cy="1094824"/>
+            </a:xfrm>
+            <a:prstGeom prst="straightConnector1">
+              <a:avLst/>
+            </a:prstGeom>
+            <a:ln>
+              <a:tailEnd type="triangle"/>
+            </a:ln>
+          </p:spPr>
+          <p:style>
+            <a:lnRef idx="1">
+              <a:schemeClr val="accent2"/>
+            </a:lnRef>
+            <a:fillRef idx="0">
+              <a:schemeClr val="accent2"/>
+            </a:fillRef>
+            <a:effectRef idx="0">
+              <a:schemeClr val="accent2"/>
+            </a:effectRef>
+            <a:fontRef idx="minor">
+              <a:schemeClr val="tx1"/>
+            </a:fontRef>
+          </p:style>
+        </p:cxnSp>
+        <p:sp>
+          <p:nvSpPr>
+            <p:cNvPr id="16" name="직사각형 15"/>
+            <p:cNvSpPr/>
+            <p:nvPr/>
+          </p:nvSpPr>
+          <p:spPr>
+            <a:xfrm>
+              <a:off x="940754" y="3946357"/>
+              <a:ext cx="1097280" cy="1010653"/>
+            </a:xfrm>
+            <a:prstGeom prst="rect">
+              <a:avLst/>
+            </a:prstGeom>
+          </p:spPr>
+          <p:style>
+            <a:lnRef idx="2">
+              <a:schemeClr val="accent6"/>
+            </a:lnRef>
+            <a:fillRef idx="1">
+              <a:schemeClr val="lt1"/>
+            </a:fillRef>
+            <a:effectRef idx="0">
+              <a:schemeClr val="accent6"/>
+            </a:effectRef>
+            <a:fontRef idx="minor">
+              <a:schemeClr val="dk1"/>
+            </a:fontRef>
+          </p:style>
+          <p:txBody>
+            <a:bodyPr rtlCol="0" anchor="ctr"/>
+            <a:lstStyle/>
+            <a:p>
+              <a:pPr algn="ctr"/>
+              <a:r>
+                <a:rPr lang="en-US" altLang="ko-KR" sz="1400" dirty="0"/>
+                <a:t>Raspberry</a:t>
+              </a:r>
+              <a:endParaRPr lang="ko-KR" altLang="en-US" sz="1400" dirty="0"/>
+            </a:p>
+          </p:txBody>
+        </p:sp>
+        <p:cxnSp>
+          <p:nvCxnSpPr>
+            <p:cNvPr id="17" name="직선 화살표 연결선 16"/>
+            <p:cNvCxnSpPr>
+              <a:stCxn id="16" idx="3"/>
+              <a:endCxn id="4" idx="1"/>
+            </p:cNvCxnSpPr>
+            <p:nvPr/>
+          </p:nvCxnSpPr>
+          <p:spPr>
+            <a:xfrm>
+              <a:off x="2038034" y="4451684"/>
+              <a:ext cx="822960" cy="0"/>
+            </a:xfrm>
+            <a:prstGeom prst="straightConnector1">
+              <a:avLst/>
+            </a:prstGeom>
+            <a:ln>
+              <a:tailEnd type="triangle"/>
+            </a:ln>
+          </p:spPr>
+          <p:style>
+            <a:lnRef idx="1">
+              <a:schemeClr val="accent1"/>
+            </a:lnRef>
+            <a:fillRef idx="0">
+              <a:schemeClr val="accent1"/>
+            </a:fillRef>
+            <a:effectRef idx="0">
+              <a:schemeClr val="accent1"/>
+            </a:effectRef>
+            <a:fontRef idx="minor">
+              <a:schemeClr val="tx1"/>
+            </a:fontRef>
+          </p:style>
+        </p:cxnSp>
+      </p:grpSp>
     </p:spTree>
     <p:extLst>
       <p:ext uri="{BB962C8B-B14F-4D97-AF65-F5344CB8AC3E}">

</xml_diff>